<commit_message>
Small update with tree subsets Stramenopiles
</commit_message>
<xml_diff>
--- a/Images/Figures_PPT/StramenopileHeatPlot.pptx
+++ b/Images/Figures_PPT/StramenopileHeatPlot.pptx
@@ -24834,7 +24834,7 @@
           </p:nvSpPr>
           <p:spPr>
             <a:xfrm>
-              <a:off x="3899499" y="6252241"/>
+              <a:off x="3585969" y="6252241"/>
               <a:ext cx="130428" cy="44175"/>
             </a:xfrm>
             <a:prstGeom prst="rect">
@@ -24869,7 +24869,7 @@
           </p:nvSpPr>
           <p:spPr>
             <a:xfrm>
-              <a:off x="3899499" y="6208066"/>
+              <a:off x="3585969" y="6208066"/>
               <a:ext cx="130428" cy="44175"/>
             </a:xfrm>
             <a:prstGeom prst="rect">
@@ -24904,7 +24904,7 @@
           </p:nvSpPr>
           <p:spPr>
             <a:xfrm>
-              <a:off x="3899499" y="6163891"/>
+              <a:off x="3585969" y="6163891"/>
               <a:ext cx="130428" cy="44175"/>
             </a:xfrm>
             <a:prstGeom prst="rect">
@@ -24939,7 +24939,7 @@
           </p:nvSpPr>
           <p:spPr>
             <a:xfrm>
-              <a:off x="3899499" y="6119716"/>
+              <a:off x="3585969" y="6119716"/>
               <a:ext cx="130428" cy="44175"/>
             </a:xfrm>
             <a:prstGeom prst="rect">
@@ -24974,7 +24974,7 @@
           </p:nvSpPr>
           <p:spPr>
             <a:xfrm>
-              <a:off x="3899499" y="6075541"/>
+              <a:off x="3585969" y="6075541"/>
               <a:ext cx="130428" cy="44175"/>
             </a:xfrm>
             <a:prstGeom prst="rect">
@@ -25009,7 +25009,7 @@
           </p:nvSpPr>
           <p:spPr>
             <a:xfrm>
-              <a:off x="3899499" y="6031366"/>
+              <a:off x="3585969" y="6031366"/>
               <a:ext cx="130428" cy="44175"/>
             </a:xfrm>
             <a:prstGeom prst="rect">
@@ -25044,7 +25044,7 @@
           </p:nvSpPr>
           <p:spPr>
             <a:xfrm>
-              <a:off x="3899499" y="5987191"/>
+              <a:off x="3585969" y="5987191"/>
               <a:ext cx="130428" cy="44175"/>
             </a:xfrm>
             <a:prstGeom prst="rect">
@@ -25079,7 +25079,7 @@
           </p:nvSpPr>
           <p:spPr>
             <a:xfrm>
-              <a:off x="3899499" y="5943016"/>
+              <a:off x="3585969" y="5943016"/>
               <a:ext cx="130428" cy="44175"/>
             </a:xfrm>
             <a:prstGeom prst="rect">
@@ -25114,7 +25114,7 @@
           </p:nvSpPr>
           <p:spPr>
             <a:xfrm>
-              <a:off x="3899499" y="5898841"/>
+              <a:off x="3585969" y="5898841"/>
               <a:ext cx="130428" cy="44175"/>
             </a:xfrm>
             <a:prstGeom prst="rect">
@@ -25149,7 +25149,7 @@
           </p:nvSpPr>
           <p:spPr>
             <a:xfrm>
-              <a:off x="3899499" y="5854666"/>
+              <a:off x="3585969" y="5854666"/>
               <a:ext cx="130428" cy="44175"/>
             </a:xfrm>
             <a:prstGeom prst="rect">
@@ -25184,7 +25184,7 @@
           </p:nvSpPr>
           <p:spPr>
             <a:xfrm>
-              <a:off x="3899499" y="5810491"/>
+              <a:off x="3585969" y="5810491"/>
               <a:ext cx="130428" cy="44175"/>
             </a:xfrm>
             <a:prstGeom prst="rect">
@@ -25219,7 +25219,7 @@
           </p:nvSpPr>
           <p:spPr>
             <a:xfrm>
-              <a:off x="3899499" y="5766316"/>
+              <a:off x="3585969" y="5766316"/>
               <a:ext cx="130428" cy="44175"/>
             </a:xfrm>
             <a:prstGeom prst="rect">
@@ -25254,7 +25254,7 @@
           </p:nvSpPr>
           <p:spPr>
             <a:xfrm>
-              <a:off x="3899499" y="5722141"/>
+              <a:off x="3585969" y="5722141"/>
               <a:ext cx="130428" cy="44175"/>
             </a:xfrm>
             <a:prstGeom prst="rect">
@@ -25289,7 +25289,7 @@
           </p:nvSpPr>
           <p:spPr>
             <a:xfrm>
-              <a:off x="3899499" y="5677966"/>
+              <a:off x="3585969" y="5677966"/>
               <a:ext cx="130428" cy="44175"/>
             </a:xfrm>
             <a:prstGeom prst="rect">
@@ -25324,7 +25324,7 @@
           </p:nvSpPr>
           <p:spPr>
             <a:xfrm>
-              <a:off x="3899499" y="5633791"/>
+              <a:off x="3585969" y="5633791"/>
               <a:ext cx="130428" cy="44175"/>
             </a:xfrm>
             <a:prstGeom prst="rect">
@@ -25359,7 +25359,7 @@
           </p:nvSpPr>
           <p:spPr>
             <a:xfrm>
-              <a:off x="3899499" y="5589616"/>
+              <a:off x="3585969" y="5589616"/>
               <a:ext cx="130428" cy="44175"/>
             </a:xfrm>
             <a:prstGeom prst="rect">
@@ -25394,7 +25394,7 @@
           </p:nvSpPr>
           <p:spPr>
             <a:xfrm>
-              <a:off x="3899499" y="5545441"/>
+              <a:off x="3585969" y="5545441"/>
               <a:ext cx="130428" cy="44175"/>
             </a:xfrm>
             <a:prstGeom prst="rect">
@@ -25429,7 +25429,7 @@
           </p:nvSpPr>
           <p:spPr>
             <a:xfrm>
-              <a:off x="3899499" y="5501266"/>
+              <a:off x="3585969" y="5501266"/>
               <a:ext cx="130428" cy="44175"/>
             </a:xfrm>
             <a:prstGeom prst="rect">
@@ -25464,7 +25464,7 @@
           </p:nvSpPr>
           <p:spPr>
             <a:xfrm>
-              <a:off x="3899499" y="5457091"/>
+              <a:off x="3585969" y="5457091"/>
               <a:ext cx="130428" cy="44175"/>
             </a:xfrm>
             <a:prstGeom prst="rect">
@@ -25499,7 +25499,7 @@
           </p:nvSpPr>
           <p:spPr>
             <a:xfrm>
-              <a:off x="3899499" y="5412916"/>
+              <a:off x="3585969" y="5412916"/>
               <a:ext cx="130428" cy="44175"/>
             </a:xfrm>
             <a:prstGeom prst="rect">
@@ -25534,7 +25534,7 @@
           </p:nvSpPr>
           <p:spPr>
             <a:xfrm>
-              <a:off x="3899499" y="5368741"/>
+              <a:off x="3585969" y="5368741"/>
               <a:ext cx="130428" cy="44175"/>
             </a:xfrm>
             <a:prstGeom prst="rect">
@@ -25569,7 +25569,7 @@
           </p:nvSpPr>
           <p:spPr>
             <a:xfrm>
-              <a:off x="3899499" y="5324566"/>
+              <a:off x="3585969" y="5324566"/>
               <a:ext cx="130428" cy="44175"/>
             </a:xfrm>
             <a:prstGeom prst="rect">
@@ -25604,7 +25604,7 @@
           </p:nvSpPr>
           <p:spPr>
             <a:xfrm>
-              <a:off x="3899499" y="5280391"/>
+              <a:off x="3585969" y="5280391"/>
               <a:ext cx="130428" cy="44175"/>
             </a:xfrm>
             <a:prstGeom prst="rect">
@@ -25639,7 +25639,7 @@
           </p:nvSpPr>
           <p:spPr>
             <a:xfrm>
-              <a:off x="3899499" y="5236216"/>
+              <a:off x="3585969" y="5236216"/>
               <a:ext cx="130428" cy="44175"/>
             </a:xfrm>
             <a:prstGeom prst="rect">
@@ -25674,7 +25674,7 @@
           </p:nvSpPr>
           <p:spPr>
             <a:xfrm>
-              <a:off x="3899499" y="5192041"/>
+              <a:off x="3585969" y="5192041"/>
               <a:ext cx="130428" cy="44175"/>
             </a:xfrm>
             <a:prstGeom prst="rect">
@@ -25709,7 +25709,7 @@
           </p:nvSpPr>
           <p:spPr>
             <a:xfrm>
-              <a:off x="3899499" y="5147866"/>
+              <a:off x="3585969" y="5147866"/>
               <a:ext cx="130428" cy="44175"/>
             </a:xfrm>
             <a:prstGeom prst="rect">
@@ -25744,7 +25744,7 @@
           </p:nvSpPr>
           <p:spPr>
             <a:xfrm>
-              <a:off x="3899499" y="5103691"/>
+              <a:off x="3585969" y="5103691"/>
               <a:ext cx="130428" cy="44175"/>
             </a:xfrm>
             <a:prstGeom prst="rect">
@@ -25779,7 +25779,7 @@
           </p:nvSpPr>
           <p:spPr>
             <a:xfrm>
-              <a:off x="3899499" y="5059516"/>
+              <a:off x="3585969" y="5059516"/>
               <a:ext cx="130428" cy="44175"/>
             </a:xfrm>
             <a:prstGeom prst="rect">
@@ -25814,7 +25814,7 @@
           </p:nvSpPr>
           <p:spPr>
             <a:xfrm>
-              <a:off x="3899499" y="5015341"/>
+              <a:off x="3585969" y="5015341"/>
               <a:ext cx="130428" cy="44175"/>
             </a:xfrm>
             <a:prstGeom prst="rect">
@@ -25849,7 +25849,7 @@
           </p:nvSpPr>
           <p:spPr>
             <a:xfrm>
-              <a:off x="3899499" y="4971166"/>
+              <a:off x="3585969" y="4971166"/>
               <a:ext cx="130428" cy="44175"/>
             </a:xfrm>
             <a:prstGeom prst="rect">
@@ -25884,7 +25884,7 @@
           </p:nvSpPr>
           <p:spPr>
             <a:xfrm>
-              <a:off x="3899499" y="4926991"/>
+              <a:off x="3585969" y="4926991"/>
               <a:ext cx="130428" cy="44175"/>
             </a:xfrm>
             <a:prstGeom prst="rect">
@@ -25919,7 +25919,7 @@
           </p:nvSpPr>
           <p:spPr>
             <a:xfrm>
-              <a:off x="3899499" y="4882816"/>
+              <a:off x="3585969" y="4882816"/>
               <a:ext cx="130428" cy="44175"/>
             </a:xfrm>
             <a:prstGeom prst="rect">
@@ -25954,7 +25954,7 @@
           </p:nvSpPr>
           <p:spPr>
             <a:xfrm>
-              <a:off x="3899499" y="4838641"/>
+              <a:off x="3585969" y="4838641"/>
               <a:ext cx="130428" cy="44175"/>
             </a:xfrm>
             <a:prstGeom prst="rect">
@@ -25989,7 +25989,7 @@
           </p:nvSpPr>
           <p:spPr>
             <a:xfrm>
-              <a:off x="3899499" y="4794466"/>
+              <a:off x="3585969" y="4794466"/>
               <a:ext cx="130428" cy="44175"/>
             </a:xfrm>
             <a:prstGeom prst="rect">
@@ -26024,7 +26024,7 @@
           </p:nvSpPr>
           <p:spPr>
             <a:xfrm>
-              <a:off x="3899499" y="4750290"/>
+              <a:off x="3585969" y="4750290"/>
               <a:ext cx="130428" cy="44175"/>
             </a:xfrm>
             <a:prstGeom prst="rect">
@@ -26059,7 +26059,7 @@
           </p:nvSpPr>
           <p:spPr>
             <a:xfrm>
-              <a:off x="3899499" y="4706115"/>
+              <a:off x="3585969" y="4706115"/>
               <a:ext cx="130428" cy="44175"/>
             </a:xfrm>
             <a:prstGeom prst="rect">
@@ -26094,7 +26094,7 @@
           </p:nvSpPr>
           <p:spPr>
             <a:xfrm>
-              <a:off x="3899499" y="4661940"/>
+              <a:off x="3585969" y="4661940"/>
               <a:ext cx="130428" cy="44175"/>
             </a:xfrm>
             <a:prstGeom prst="rect">
@@ -26129,7 +26129,7 @@
           </p:nvSpPr>
           <p:spPr>
             <a:xfrm>
-              <a:off x="3899499" y="4617765"/>
+              <a:off x="3585969" y="4617765"/>
               <a:ext cx="130428" cy="44175"/>
             </a:xfrm>
             <a:prstGeom prst="rect">
@@ -26164,7 +26164,7 @@
           </p:nvSpPr>
           <p:spPr>
             <a:xfrm>
-              <a:off x="3899499" y="4573590"/>
+              <a:off x="3585969" y="4573590"/>
               <a:ext cx="130428" cy="44175"/>
             </a:xfrm>
             <a:prstGeom prst="rect">
@@ -26199,7 +26199,7 @@
           </p:nvSpPr>
           <p:spPr>
             <a:xfrm>
-              <a:off x="3899499" y="4529415"/>
+              <a:off x="3585969" y="4529415"/>
               <a:ext cx="130428" cy="44175"/>
             </a:xfrm>
             <a:prstGeom prst="rect">
@@ -26234,7 +26234,7 @@
           </p:nvSpPr>
           <p:spPr>
             <a:xfrm>
-              <a:off x="3899499" y="4485240"/>
+              <a:off x="3585969" y="4485240"/>
               <a:ext cx="130428" cy="44175"/>
             </a:xfrm>
             <a:prstGeom prst="rect">
@@ -26269,7 +26269,7 @@
           </p:nvSpPr>
           <p:spPr>
             <a:xfrm>
-              <a:off x="3899499" y="4441065"/>
+              <a:off x="3585969" y="4441065"/>
               <a:ext cx="130428" cy="44175"/>
             </a:xfrm>
             <a:prstGeom prst="rect">
@@ -26304,7 +26304,7 @@
           </p:nvSpPr>
           <p:spPr>
             <a:xfrm>
-              <a:off x="3899499" y="4396890"/>
+              <a:off x="3585969" y="4396890"/>
               <a:ext cx="130428" cy="44175"/>
             </a:xfrm>
             <a:prstGeom prst="rect">
@@ -26339,7 +26339,7 @@
           </p:nvSpPr>
           <p:spPr>
             <a:xfrm>
-              <a:off x="3899499" y="4352715"/>
+              <a:off x="3585969" y="4352715"/>
               <a:ext cx="130428" cy="44175"/>
             </a:xfrm>
             <a:prstGeom prst="rect">
@@ -26374,7 +26374,7 @@
           </p:nvSpPr>
           <p:spPr>
             <a:xfrm>
-              <a:off x="3899499" y="4308540"/>
+              <a:off x="3585969" y="4308540"/>
               <a:ext cx="130428" cy="44175"/>
             </a:xfrm>
             <a:prstGeom prst="rect">
@@ -26409,7 +26409,7 @@
           </p:nvSpPr>
           <p:spPr>
             <a:xfrm>
-              <a:off x="3899499" y="4264365"/>
+              <a:off x="3585969" y="4264365"/>
               <a:ext cx="130428" cy="44175"/>
             </a:xfrm>
             <a:prstGeom prst="rect">
@@ -26444,7 +26444,7 @@
           </p:nvSpPr>
           <p:spPr>
             <a:xfrm>
-              <a:off x="3899499" y="4220190"/>
+              <a:off x="3585969" y="4220190"/>
               <a:ext cx="130428" cy="44175"/>
             </a:xfrm>
             <a:prstGeom prst="rect">
@@ -26479,7 +26479,7 @@
           </p:nvSpPr>
           <p:spPr>
             <a:xfrm>
-              <a:off x="3899499" y="4176015"/>
+              <a:off x="3585969" y="4176015"/>
               <a:ext cx="130428" cy="44175"/>
             </a:xfrm>
             <a:prstGeom prst="rect">
@@ -26514,7 +26514,7 @@
           </p:nvSpPr>
           <p:spPr>
             <a:xfrm>
-              <a:off x="3899499" y="4131840"/>
+              <a:off x="3585969" y="4131840"/>
               <a:ext cx="130428" cy="44175"/>
             </a:xfrm>
             <a:prstGeom prst="rect">
@@ -26549,7 +26549,7 @@
           </p:nvSpPr>
           <p:spPr>
             <a:xfrm>
-              <a:off x="3899499" y="4087665"/>
+              <a:off x="3585969" y="4087665"/>
               <a:ext cx="130428" cy="44175"/>
             </a:xfrm>
             <a:prstGeom prst="rect">
@@ -26584,7 +26584,7 @@
           </p:nvSpPr>
           <p:spPr>
             <a:xfrm>
-              <a:off x="3899499" y="4043490"/>
+              <a:off x="3585969" y="4043490"/>
               <a:ext cx="130428" cy="44175"/>
             </a:xfrm>
             <a:prstGeom prst="rect">
@@ -26619,7 +26619,7 @@
           </p:nvSpPr>
           <p:spPr>
             <a:xfrm>
-              <a:off x="3899499" y="3999315"/>
+              <a:off x="3585969" y="3999315"/>
               <a:ext cx="130428" cy="44175"/>
             </a:xfrm>
             <a:prstGeom prst="rect">
@@ -26654,7 +26654,7 @@
           </p:nvSpPr>
           <p:spPr>
             <a:xfrm>
-              <a:off x="3899499" y="3955140"/>
+              <a:off x="3585969" y="3955140"/>
               <a:ext cx="130428" cy="44175"/>
             </a:xfrm>
             <a:prstGeom prst="rect">
@@ -26689,7 +26689,7 @@
           </p:nvSpPr>
           <p:spPr>
             <a:xfrm>
-              <a:off x="3899499" y="3910965"/>
+              <a:off x="3585969" y="3910965"/>
               <a:ext cx="130428" cy="44175"/>
             </a:xfrm>
             <a:prstGeom prst="rect">
@@ -26724,7 +26724,7 @@
           </p:nvSpPr>
           <p:spPr>
             <a:xfrm>
-              <a:off x="3899499" y="3866790"/>
+              <a:off x="3585969" y="3866790"/>
               <a:ext cx="130428" cy="44175"/>
             </a:xfrm>
             <a:prstGeom prst="rect">
@@ -26759,7 +26759,7 @@
           </p:nvSpPr>
           <p:spPr>
             <a:xfrm>
-              <a:off x="3899499" y="3822615"/>
+              <a:off x="3585969" y="3822615"/>
               <a:ext cx="130428" cy="44175"/>
             </a:xfrm>
             <a:prstGeom prst="rect">
@@ -26794,7 +26794,7 @@
           </p:nvSpPr>
           <p:spPr>
             <a:xfrm>
-              <a:off x="3899499" y="3778440"/>
+              <a:off x="3585969" y="3778440"/>
               <a:ext cx="130428" cy="44175"/>
             </a:xfrm>
             <a:prstGeom prst="rect">
@@ -26829,7 +26829,7 @@
           </p:nvSpPr>
           <p:spPr>
             <a:xfrm>
-              <a:off x="3899499" y="3734265"/>
+              <a:off x="3585969" y="3734265"/>
               <a:ext cx="130428" cy="44175"/>
             </a:xfrm>
             <a:prstGeom prst="rect">
@@ -26864,7 +26864,7 @@
           </p:nvSpPr>
           <p:spPr>
             <a:xfrm>
-              <a:off x="3899499" y="3690090"/>
+              <a:off x="3585969" y="3690090"/>
               <a:ext cx="130428" cy="44175"/>
             </a:xfrm>
             <a:prstGeom prst="rect">
@@ -26899,7 +26899,7 @@
           </p:nvSpPr>
           <p:spPr>
             <a:xfrm>
-              <a:off x="3899499" y="3645915"/>
+              <a:off x="3585969" y="3645915"/>
               <a:ext cx="130428" cy="44175"/>
             </a:xfrm>
             <a:prstGeom prst="rect">
@@ -26934,7 +26934,7 @@
           </p:nvSpPr>
           <p:spPr>
             <a:xfrm>
-              <a:off x="3899499" y="3601740"/>
+              <a:off x="3585969" y="3601740"/>
               <a:ext cx="130428" cy="44175"/>
             </a:xfrm>
             <a:prstGeom prst="rect">
@@ -26969,7 +26969,7 @@
           </p:nvSpPr>
           <p:spPr>
             <a:xfrm>
-              <a:off x="3899499" y="3557565"/>
+              <a:off x="3585969" y="3557565"/>
               <a:ext cx="130428" cy="44175"/>
             </a:xfrm>
             <a:prstGeom prst="rect">
@@ -27004,7 +27004,7 @@
           </p:nvSpPr>
           <p:spPr>
             <a:xfrm>
-              <a:off x="3899499" y="3513390"/>
+              <a:off x="3585969" y="3513390"/>
               <a:ext cx="130428" cy="44175"/>
             </a:xfrm>
             <a:prstGeom prst="rect">
@@ -27039,7 +27039,7 @@
           </p:nvSpPr>
           <p:spPr>
             <a:xfrm>
-              <a:off x="3899499" y="3469215"/>
+              <a:off x="3585969" y="3469215"/>
               <a:ext cx="130428" cy="44175"/>
             </a:xfrm>
             <a:prstGeom prst="rect">
@@ -27074,7 +27074,7 @@
           </p:nvSpPr>
           <p:spPr>
             <a:xfrm>
-              <a:off x="3899499" y="3425040"/>
+              <a:off x="3585969" y="3425040"/>
               <a:ext cx="130428" cy="44175"/>
             </a:xfrm>
             <a:prstGeom prst="rect">
@@ -27109,7 +27109,7 @@
           </p:nvSpPr>
           <p:spPr>
             <a:xfrm>
-              <a:off x="3899499" y="3380865"/>
+              <a:off x="3585969" y="3380865"/>
               <a:ext cx="130428" cy="44175"/>
             </a:xfrm>
             <a:prstGeom prst="rect">
@@ -27144,7 +27144,7 @@
           </p:nvSpPr>
           <p:spPr>
             <a:xfrm>
-              <a:off x="3899499" y="3336690"/>
+              <a:off x="3585969" y="3336690"/>
               <a:ext cx="130428" cy="44175"/>
             </a:xfrm>
             <a:prstGeom prst="rect">
@@ -27179,7 +27179,7 @@
           </p:nvSpPr>
           <p:spPr>
             <a:xfrm>
-              <a:off x="3899499" y="3292515"/>
+              <a:off x="3585969" y="3292515"/>
               <a:ext cx="130428" cy="44175"/>
             </a:xfrm>
             <a:prstGeom prst="rect">
@@ -27214,7 +27214,7 @@
           </p:nvSpPr>
           <p:spPr>
             <a:xfrm>
-              <a:off x="3899499" y="3248340"/>
+              <a:off x="3585969" y="3248340"/>
               <a:ext cx="130428" cy="44175"/>
             </a:xfrm>
             <a:prstGeom prst="rect">
@@ -27249,7 +27249,7 @@
           </p:nvSpPr>
           <p:spPr>
             <a:xfrm>
-              <a:off x="3899499" y="3204165"/>
+              <a:off x="3585969" y="3204165"/>
               <a:ext cx="130428" cy="44175"/>
             </a:xfrm>
             <a:prstGeom prst="rect">
@@ -27284,7 +27284,7 @@
           </p:nvSpPr>
           <p:spPr>
             <a:xfrm>
-              <a:off x="3899499" y="3159990"/>
+              <a:off x="3585969" y="3159990"/>
               <a:ext cx="130428" cy="44175"/>
             </a:xfrm>
             <a:prstGeom prst="rect">
@@ -27319,7 +27319,7 @@
           </p:nvSpPr>
           <p:spPr>
             <a:xfrm>
-              <a:off x="3899499" y="3115815"/>
+              <a:off x="3585969" y="3115815"/>
               <a:ext cx="130428" cy="44175"/>
             </a:xfrm>
             <a:prstGeom prst="rect">
@@ -27354,7 +27354,7 @@
           </p:nvSpPr>
           <p:spPr>
             <a:xfrm>
-              <a:off x="3899499" y="3071640"/>
+              <a:off x="3585969" y="3071640"/>
               <a:ext cx="130428" cy="44175"/>
             </a:xfrm>
             <a:prstGeom prst="rect">
@@ -27389,7 +27389,7 @@
           </p:nvSpPr>
           <p:spPr>
             <a:xfrm>
-              <a:off x="3899499" y="3027465"/>
+              <a:off x="3585969" y="3027465"/>
               <a:ext cx="130428" cy="44175"/>
             </a:xfrm>
             <a:prstGeom prst="rect">
@@ -27424,7 +27424,7 @@
           </p:nvSpPr>
           <p:spPr>
             <a:xfrm>
-              <a:off x="3899499" y="2983290"/>
+              <a:off x="3585969" y="2983290"/>
               <a:ext cx="130428" cy="44175"/>
             </a:xfrm>
             <a:prstGeom prst="rect">
@@ -27459,7 +27459,7 @@
           </p:nvSpPr>
           <p:spPr>
             <a:xfrm>
-              <a:off x="3899499" y="2939115"/>
+              <a:off x="3585969" y="2939115"/>
               <a:ext cx="130428" cy="44175"/>
             </a:xfrm>
             <a:prstGeom prst="rect">
@@ -27494,7 +27494,7 @@
           </p:nvSpPr>
           <p:spPr>
             <a:xfrm>
-              <a:off x="3899499" y="2894940"/>
+              <a:off x="3585969" y="2894940"/>
               <a:ext cx="130428" cy="44175"/>
             </a:xfrm>
             <a:prstGeom prst="rect">
@@ -27529,7 +27529,7 @@
           </p:nvSpPr>
           <p:spPr>
             <a:xfrm>
-              <a:off x="3899499" y="2850765"/>
+              <a:off x="3585969" y="2850765"/>
               <a:ext cx="130428" cy="44175"/>
             </a:xfrm>
             <a:prstGeom prst="rect">
@@ -27564,7 +27564,7 @@
           </p:nvSpPr>
           <p:spPr>
             <a:xfrm>
-              <a:off x="3899499" y="2806590"/>
+              <a:off x="3585969" y="2806590"/>
               <a:ext cx="130428" cy="44175"/>
             </a:xfrm>
             <a:prstGeom prst="rect">
@@ -27599,7 +27599,7 @@
           </p:nvSpPr>
           <p:spPr>
             <a:xfrm>
-              <a:off x="3899499" y="2762415"/>
+              <a:off x="3585969" y="2762415"/>
               <a:ext cx="130428" cy="44175"/>
             </a:xfrm>
             <a:prstGeom prst="rect">
@@ -27634,7 +27634,7 @@
           </p:nvSpPr>
           <p:spPr>
             <a:xfrm>
-              <a:off x="3899499" y="2718240"/>
+              <a:off x="3585969" y="2718240"/>
               <a:ext cx="130428" cy="44175"/>
             </a:xfrm>
             <a:prstGeom prst="rect">
@@ -27669,7 +27669,7 @@
           </p:nvSpPr>
           <p:spPr>
             <a:xfrm>
-              <a:off x="3899499" y="2674065"/>
+              <a:off x="3585969" y="2674065"/>
               <a:ext cx="130428" cy="44175"/>
             </a:xfrm>
             <a:prstGeom prst="rect">
@@ -27704,7 +27704,7 @@
           </p:nvSpPr>
           <p:spPr>
             <a:xfrm>
-              <a:off x="3899499" y="2629890"/>
+              <a:off x="3585969" y="2629890"/>
               <a:ext cx="130428" cy="44175"/>
             </a:xfrm>
             <a:prstGeom prst="rect">
@@ -27739,7 +27739,7 @@
           </p:nvSpPr>
           <p:spPr>
             <a:xfrm>
-              <a:off x="3899499" y="2585715"/>
+              <a:off x="3585969" y="2585715"/>
               <a:ext cx="130428" cy="44175"/>
             </a:xfrm>
             <a:prstGeom prst="rect">
@@ -27774,7 +27774,7 @@
           </p:nvSpPr>
           <p:spPr>
             <a:xfrm>
-              <a:off x="3899499" y="2541540"/>
+              <a:off x="3585969" y="2541540"/>
               <a:ext cx="130428" cy="44175"/>
             </a:xfrm>
             <a:prstGeom prst="rect">
@@ -27809,7 +27809,7 @@
           </p:nvSpPr>
           <p:spPr>
             <a:xfrm>
-              <a:off x="3899499" y="2497365"/>
+              <a:off x="3585969" y="2497365"/>
               <a:ext cx="130428" cy="44175"/>
             </a:xfrm>
             <a:prstGeom prst="rect">
@@ -27844,7 +27844,7 @@
           </p:nvSpPr>
           <p:spPr>
             <a:xfrm>
-              <a:off x="3899499" y="2453190"/>
+              <a:off x="3585969" y="2453190"/>
               <a:ext cx="130428" cy="44175"/>
             </a:xfrm>
             <a:prstGeom prst="rect">
@@ -27879,7 +27879,7 @@
           </p:nvSpPr>
           <p:spPr>
             <a:xfrm>
-              <a:off x="3899499" y="2409015"/>
+              <a:off x="3585969" y="2409015"/>
               <a:ext cx="130428" cy="44175"/>
             </a:xfrm>
             <a:prstGeom prst="rect">
@@ -27914,7 +27914,7 @@
           </p:nvSpPr>
           <p:spPr>
             <a:xfrm>
-              <a:off x="3899499" y="2364840"/>
+              <a:off x="3585969" y="2364840"/>
               <a:ext cx="130428" cy="44175"/>
             </a:xfrm>
             <a:prstGeom prst="rect">
@@ -27949,7 +27949,7 @@
           </p:nvSpPr>
           <p:spPr>
             <a:xfrm>
-              <a:off x="3899499" y="2320665"/>
+              <a:off x="3585969" y="2320665"/>
               <a:ext cx="130428" cy="44175"/>
             </a:xfrm>
             <a:prstGeom prst="rect">
@@ -27984,7 +27984,7 @@
           </p:nvSpPr>
           <p:spPr>
             <a:xfrm>
-              <a:off x="3899499" y="2276490"/>
+              <a:off x="3585969" y="2276490"/>
               <a:ext cx="130428" cy="44175"/>
             </a:xfrm>
             <a:prstGeom prst="rect">
@@ -28019,7 +28019,7 @@
           </p:nvSpPr>
           <p:spPr>
             <a:xfrm>
-              <a:off x="3899499" y="2232315"/>
+              <a:off x="3585969" y="2232315"/>
               <a:ext cx="130428" cy="44175"/>
             </a:xfrm>
             <a:prstGeom prst="rect">
@@ -28054,7 +28054,7 @@
           </p:nvSpPr>
           <p:spPr>
             <a:xfrm>
-              <a:off x="3899499" y="2188140"/>
+              <a:off x="3585969" y="2188140"/>
               <a:ext cx="130428" cy="44175"/>
             </a:xfrm>
             <a:prstGeom prst="rect">
@@ -28089,7 +28089,7 @@
           </p:nvSpPr>
           <p:spPr>
             <a:xfrm>
-              <a:off x="3899499" y="2143965"/>
+              <a:off x="3585969" y="2143965"/>
               <a:ext cx="130428" cy="44175"/>
             </a:xfrm>
             <a:prstGeom prst="rect">
@@ -28124,7 +28124,7 @@
           </p:nvSpPr>
           <p:spPr>
             <a:xfrm>
-              <a:off x="3899499" y="2099790"/>
+              <a:off x="3585969" y="2099790"/>
               <a:ext cx="130428" cy="44175"/>
             </a:xfrm>
             <a:prstGeom prst="rect">
@@ -28159,7 +28159,7 @@
           </p:nvSpPr>
           <p:spPr>
             <a:xfrm>
-              <a:off x="3899499" y="2055615"/>
+              <a:off x="3585969" y="2055615"/>
               <a:ext cx="130428" cy="44175"/>
             </a:xfrm>
             <a:prstGeom prst="rect">
@@ -28194,7 +28194,7 @@
           </p:nvSpPr>
           <p:spPr>
             <a:xfrm>
-              <a:off x="3899499" y="2011440"/>
+              <a:off x="3585969" y="2011440"/>
               <a:ext cx="130428" cy="44175"/>
             </a:xfrm>
             <a:prstGeom prst="rect">
@@ -28229,7 +28229,7 @@
           </p:nvSpPr>
           <p:spPr>
             <a:xfrm>
-              <a:off x="3899499" y="1967265"/>
+              <a:off x="3585969" y="1967265"/>
               <a:ext cx="130428" cy="44175"/>
             </a:xfrm>
             <a:prstGeom prst="rect">
@@ -28264,7 +28264,7 @@
           </p:nvSpPr>
           <p:spPr>
             <a:xfrm>
-              <a:off x="3899499" y="1923090"/>
+              <a:off x="3585969" y="1923090"/>
               <a:ext cx="130428" cy="44175"/>
             </a:xfrm>
             <a:prstGeom prst="rect">
@@ -28299,7 +28299,7 @@
           </p:nvSpPr>
           <p:spPr>
             <a:xfrm>
-              <a:off x="3899499" y="1878915"/>
+              <a:off x="3585969" y="1878915"/>
               <a:ext cx="130428" cy="44175"/>
             </a:xfrm>
             <a:prstGeom prst="rect">
@@ -28334,7 +28334,7 @@
           </p:nvSpPr>
           <p:spPr>
             <a:xfrm>
-              <a:off x="3899499" y="1834740"/>
+              <a:off x="3585969" y="1834740"/>
               <a:ext cx="130428" cy="44175"/>
             </a:xfrm>
             <a:prstGeom prst="rect">
@@ -28369,7 +28369,7 @@
           </p:nvSpPr>
           <p:spPr>
             <a:xfrm>
-              <a:off x="3899499" y="1790565"/>
+              <a:off x="3585969" y="1790565"/>
               <a:ext cx="130428" cy="44175"/>
             </a:xfrm>
             <a:prstGeom prst="rect">
@@ -28404,7 +28404,7 @@
           </p:nvSpPr>
           <p:spPr>
             <a:xfrm>
-              <a:off x="3899499" y="1746390"/>
+              <a:off x="3585969" y="1746390"/>
               <a:ext cx="130428" cy="44175"/>
             </a:xfrm>
             <a:prstGeom prst="rect">
@@ -28439,7 +28439,7 @@
           </p:nvSpPr>
           <p:spPr>
             <a:xfrm>
-              <a:off x="3899499" y="1702215"/>
+              <a:off x="3585969" y="1702215"/>
               <a:ext cx="130428" cy="44175"/>
             </a:xfrm>
             <a:prstGeom prst="rect">
@@ -28474,7 +28474,7 @@
           </p:nvSpPr>
           <p:spPr>
             <a:xfrm>
-              <a:off x="3899499" y="1658040"/>
+              <a:off x="3585969" y="1658040"/>
               <a:ext cx="130428" cy="44175"/>
             </a:xfrm>
             <a:prstGeom prst="rect">
@@ -28509,7 +28509,7 @@
           </p:nvSpPr>
           <p:spPr>
             <a:xfrm>
-              <a:off x="3899499" y="1613865"/>
+              <a:off x="3585969" y="1613865"/>
               <a:ext cx="130428" cy="44175"/>
             </a:xfrm>
             <a:prstGeom prst="rect">
@@ -28544,7 +28544,7 @@
           </p:nvSpPr>
           <p:spPr>
             <a:xfrm>
-              <a:off x="3899499" y="1569690"/>
+              <a:off x="3585969" y="1569690"/>
               <a:ext cx="130428" cy="44175"/>
             </a:xfrm>
             <a:prstGeom prst="rect">
@@ -28579,7 +28579,7 @@
           </p:nvSpPr>
           <p:spPr>
             <a:xfrm>
-              <a:off x="3899499" y="1525515"/>
+              <a:off x="3585969" y="1525515"/>
               <a:ext cx="130428" cy="44175"/>
             </a:xfrm>
             <a:prstGeom prst="rect">
@@ -28614,7 +28614,7 @@
           </p:nvSpPr>
           <p:spPr>
             <a:xfrm>
-              <a:off x="3899499" y="1481340"/>
+              <a:off x="3585969" y="1481340"/>
               <a:ext cx="130428" cy="44175"/>
             </a:xfrm>
             <a:prstGeom prst="rect">
@@ -28649,7 +28649,7 @@
           </p:nvSpPr>
           <p:spPr>
             <a:xfrm>
-              <a:off x="3899499" y="1437165"/>
+              <a:off x="3585969" y="1437165"/>
               <a:ext cx="130428" cy="44175"/>
             </a:xfrm>
             <a:prstGeom prst="rect">
@@ -28684,7 +28684,7 @@
           </p:nvSpPr>
           <p:spPr>
             <a:xfrm>
-              <a:off x="3899499" y="1392990"/>
+              <a:off x="3585969" y="1392990"/>
               <a:ext cx="130428" cy="44175"/>
             </a:xfrm>
             <a:prstGeom prst="rect">
@@ -28719,7 +28719,7 @@
           </p:nvSpPr>
           <p:spPr>
             <a:xfrm>
-              <a:off x="4029928" y="6252241"/>
+              <a:off x="3716397" y="6252241"/>
               <a:ext cx="130428" cy="44175"/>
             </a:xfrm>
             <a:prstGeom prst="rect">
@@ -28754,7 +28754,7 @@
           </p:nvSpPr>
           <p:spPr>
             <a:xfrm>
-              <a:off x="4029928" y="6208066"/>
+              <a:off x="3716397" y="6208066"/>
               <a:ext cx="130428" cy="44175"/>
             </a:xfrm>
             <a:prstGeom prst="rect">
@@ -28789,7 +28789,7 @@
           </p:nvSpPr>
           <p:spPr>
             <a:xfrm>
-              <a:off x="4029928" y="6163891"/>
+              <a:off x="3716397" y="6163891"/>
               <a:ext cx="130428" cy="44175"/>
             </a:xfrm>
             <a:prstGeom prst="rect">
@@ -28824,7 +28824,7 @@
           </p:nvSpPr>
           <p:spPr>
             <a:xfrm>
-              <a:off x="4029928" y="6119716"/>
+              <a:off x="3716397" y="6119716"/>
               <a:ext cx="130428" cy="44175"/>
             </a:xfrm>
             <a:prstGeom prst="rect">
@@ -28859,7 +28859,7 @@
           </p:nvSpPr>
           <p:spPr>
             <a:xfrm>
-              <a:off x="4029928" y="6075541"/>
+              <a:off x="3716397" y="6075541"/>
               <a:ext cx="130428" cy="44175"/>
             </a:xfrm>
             <a:prstGeom prst="rect">
@@ -28894,7 +28894,7 @@
           </p:nvSpPr>
           <p:spPr>
             <a:xfrm>
-              <a:off x="4029928" y="6031366"/>
+              <a:off x="3716397" y="6031366"/>
               <a:ext cx="130428" cy="44175"/>
             </a:xfrm>
             <a:prstGeom prst="rect">
@@ -28929,7 +28929,7 @@
           </p:nvSpPr>
           <p:spPr>
             <a:xfrm>
-              <a:off x="4029928" y="5987191"/>
+              <a:off x="3716397" y="5987191"/>
               <a:ext cx="130428" cy="44175"/>
             </a:xfrm>
             <a:prstGeom prst="rect">
@@ -28964,7 +28964,7 @@
           </p:nvSpPr>
           <p:spPr>
             <a:xfrm>
-              <a:off x="4029928" y="5943016"/>
+              <a:off x="3716397" y="5943016"/>
               <a:ext cx="130428" cy="44175"/>
             </a:xfrm>
             <a:prstGeom prst="rect">
@@ -28999,7 +28999,7 @@
           </p:nvSpPr>
           <p:spPr>
             <a:xfrm>
-              <a:off x="4029928" y="5898841"/>
+              <a:off x="3716397" y="5898841"/>
               <a:ext cx="130428" cy="44175"/>
             </a:xfrm>
             <a:prstGeom prst="rect">
@@ -29034,7 +29034,7 @@
           </p:nvSpPr>
           <p:spPr>
             <a:xfrm>
-              <a:off x="4029928" y="5854666"/>
+              <a:off x="3716397" y="5854666"/>
               <a:ext cx="130428" cy="44175"/>
             </a:xfrm>
             <a:prstGeom prst="rect">
@@ -29069,7 +29069,7 @@
           </p:nvSpPr>
           <p:spPr>
             <a:xfrm>
-              <a:off x="4029928" y="5810491"/>
+              <a:off x="3716397" y="5810491"/>
               <a:ext cx="130428" cy="44175"/>
             </a:xfrm>
             <a:prstGeom prst="rect">
@@ -29104,7 +29104,7 @@
           </p:nvSpPr>
           <p:spPr>
             <a:xfrm>
-              <a:off x="4029928" y="5766316"/>
+              <a:off x="3716397" y="5766316"/>
               <a:ext cx="130428" cy="44175"/>
             </a:xfrm>
             <a:prstGeom prst="rect">
@@ -29139,7 +29139,7 @@
           </p:nvSpPr>
           <p:spPr>
             <a:xfrm>
-              <a:off x="4029928" y="5722141"/>
+              <a:off x="3716397" y="5722141"/>
               <a:ext cx="130428" cy="44175"/>
             </a:xfrm>
             <a:prstGeom prst="rect">
@@ -29174,7 +29174,7 @@
           </p:nvSpPr>
           <p:spPr>
             <a:xfrm>
-              <a:off x="4029928" y="5677966"/>
+              <a:off x="3716397" y="5677966"/>
               <a:ext cx="130428" cy="44175"/>
             </a:xfrm>
             <a:prstGeom prst="rect">
@@ -29209,7 +29209,7 @@
           </p:nvSpPr>
           <p:spPr>
             <a:xfrm>
-              <a:off x="4029928" y="5633791"/>
+              <a:off x="3716397" y="5633791"/>
               <a:ext cx="130428" cy="44175"/>
             </a:xfrm>
             <a:prstGeom prst="rect">
@@ -29244,7 +29244,7 @@
           </p:nvSpPr>
           <p:spPr>
             <a:xfrm>
-              <a:off x="4029928" y="5589616"/>
+              <a:off x="3716397" y="5589616"/>
               <a:ext cx="130428" cy="44175"/>
             </a:xfrm>
             <a:prstGeom prst="rect">
@@ -29279,7 +29279,7 @@
           </p:nvSpPr>
           <p:spPr>
             <a:xfrm>
-              <a:off x="4029928" y="5545441"/>
+              <a:off x="3716397" y="5545441"/>
               <a:ext cx="130428" cy="44175"/>
             </a:xfrm>
             <a:prstGeom prst="rect">
@@ -29314,7 +29314,7 @@
           </p:nvSpPr>
           <p:spPr>
             <a:xfrm>
-              <a:off x="4029928" y="5501266"/>
+              <a:off x="3716397" y="5501266"/>
               <a:ext cx="130428" cy="44175"/>
             </a:xfrm>
             <a:prstGeom prst="rect">
@@ -29349,7 +29349,7 @@
           </p:nvSpPr>
           <p:spPr>
             <a:xfrm>
-              <a:off x="4029928" y="5457091"/>
+              <a:off x="3716397" y="5457091"/>
               <a:ext cx="130428" cy="44175"/>
             </a:xfrm>
             <a:prstGeom prst="rect">
@@ -29384,7 +29384,7 @@
           </p:nvSpPr>
           <p:spPr>
             <a:xfrm>
-              <a:off x="4029928" y="5412916"/>
+              <a:off x="3716397" y="5412916"/>
               <a:ext cx="130428" cy="44175"/>
             </a:xfrm>
             <a:prstGeom prst="rect">
@@ -29419,7 +29419,7 @@
           </p:nvSpPr>
           <p:spPr>
             <a:xfrm>
-              <a:off x="4029928" y="5368741"/>
+              <a:off x="3716397" y="5368741"/>
               <a:ext cx="130428" cy="44175"/>
             </a:xfrm>
             <a:prstGeom prst="rect">
@@ -29454,7 +29454,7 @@
           </p:nvSpPr>
           <p:spPr>
             <a:xfrm>
-              <a:off x="4029928" y="5324566"/>
+              <a:off x="3716397" y="5324566"/>
               <a:ext cx="130428" cy="44175"/>
             </a:xfrm>
             <a:prstGeom prst="rect">
@@ -29489,7 +29489,7 @@
           </p:nvSpPr>
           <p:spPr>
             <a:xfrm>
-              <a:off x="4029928" y="5280391"/>
+              <a:off x="3716397" y="5280391"/>
               <a:ext cx="130428" cy="44175"/>
             </a:xfrm>
             <a:prstGeom prst="rect">
@@ -29524,7 +29524,7 @@
           </p:nvSpPr>
           <p:spPr>
             <a:xfrm>
-              <a:off x="4029928" y="5236216"/>
+              <a:off x="3716397" y="5236216"/>
               <a:ext cx="130428" cy="44175"/>
             </a:xfrm>
             <a:prstGeom prst="rect">
@@ -29559,7 +29559,7 @@
           </p:nvSpPr>
           <p:spPr>
             <a:xfrm>
-              <a:off x="4029928" y="5192041"/>
+              <a:off x="3716397" y="5192041"/>
               <a:ext cx="130428" cy="44175"/>
             </a:xfrm>
             <a:prstGeom prst="rect">
@@ -29594,7 +29594,7 @@
           </p:nvSpPr>
           <p:spPr>
             <a:xfrm>
-              <a:off x="4029928" y="5147866"/>
+              <a:off x="3716397" y="5147866"/>
               <a:ext cx="130428" cy="44175"/>
             </a:xfrm>
             <a:prstGeom prst="rect">
@@ -29629,7 +29629,7 @@
           </p:nvSpPr>
           <p:spPr>
             <a:xfrm>
-              <a:off x="4029928" y="5103691"/>
+              <a:off x="3716397" y="5103691"/>
               <a:ext cx="130428" cy="44175"/>
             </a:xfrm>
             <a:prstGeom prst="rect">
@@ -29664,7 +29664,7 @@
           </p:nvSpPr>
           <p:spPr>
             <a:xfrm>
-              <a:off x="4029928" y="5059516"/>
+              <a:off x="3716397" y="5059516"/>
               <a:ext cx="130428" cy="44175"/>
             </a:xfrm>
             <a:prstGeom prst="rect">
@@ -29699,7 +29699,7 @@
           </p:nvSpPr>
           <p:spPr>
             <a:xfrm>
-              <a:off x="4029928" y="5015341"/>
+              <a:off x="3716397" y="5015341"/>
               <a:ext cx="130428" cy="44175"/>
             </a:xfrm>
             <a:prstGeom prst="rect">
@@ -29734,7 +29734,7 @@
           </p:nvSpPr>
           <p:spPr>
             <a:xfrm>
-              <a:off x="4029928" y="4971166"/>
+              <a:off x="3716397" y="4971166"/>
               <a:ext cx="130428" cy="44175"/>
             </a:xfrm>
             <a:prstGeom prst="rect">
@@ -29769,7 +29769,7 @@
           </p:nvSpPr>
           <p:spPr>
             <a:xfrm>
-              <a:off x="4029928" y="4926991"/>
+              <a:off x="3716397" y="4926991"/>
               <a:ext cx="130428" cy="44175"/>
             </a:xfrm>
             <a:prstGeom prst="rect">
@@ -29804,7 +29804,7 @@
           </p:nvSpPr>
           <p:spPr>
             <a:xfrm>
-              <a:off x="4029928" y="4882816"/>
+              <a:off x="3716397" y="4882816"/>
               <a:ext cx="130428" cy="44175"/>
             </a:xfrm>
             <a:prstGeom prst="rect">
@@ -29839,7 +29839,7 @@
           </p:nvSpPr>
           <p:spPr>
             <a:xfrm>
-              <a:off x="4029928" y="4838641"/>
+              <a:off x="3716397" y="4838641"/>
               <a:ext cx="130428" cy="44175"/>
             </a:xfrm>
             <a:prstGeom prst="rect">
@@ -29874,7 +29874,7 @@
           </p:nvSpPr>
           <p:spPr>
             <a:xfrm>
-              <a:off x="4029928" y="4794466"/>
+              <a:off x="3716397" y="4794466"/>
               <a:ext cx="130428" cy="44175"/>
             </a:xfrm>
             <a:prstGeom prst="rect">
@@ -29909,7 +29909,7 @@
           </p:nvSpPr>
           <p:spPr>
             <a:xfrm>
-              <a:off x="4029928" y="4750290"/>
+              <a:off x="3716397" y="4750290"/>
               <a:ext cx="130428" cy="44175"/>
             </a:xfrm>
             <a:prstGeom prst="rect">
@@ -29944,7 +29944,7 @@
           </p:nvSpPr>
           <p:spPr>
             <a:xfrm>
-              <a:off x="4029928" y="4706115"/>
+              <a:off x="3716397" y="4706115"/>
               <a:ext cx="130428" cy="44175"/>
             </a:xfrm>
             <a:prstGeom prst="rect">
@@ -29979,7 +29979,7 @@
           </p:nvSpPr>
           <p:spPr>
             <a:xfrm>
-              <a:off x="4029928" y="4661940"/>
+              <a:off x="3716397" y="4661940"/>
               <a:ext cx="130428" cy="44175"/>
             </a:xfrm>
             <a:prstGeom prst="rect">
@@ -30014,7 +30014,7 @@
           </p:nvSpPr>
           <p:spPr>
             <a:xfrm>
-              <a:off x="4029928" y="4617765"/>
+              <a:off x="3716397" y="4617765"/>
               <a:ext cx="130428" cy="44175"/>
             </a:xfrm>
             <a:prstGeom prst="rect">
@@ -30049,7 +30049,7 @@
           </p:nvSpPr>
           <p:spPr>
             <a:xfrm>
-              <a:off x="4029928" y="4573590"/>
+              <a:off x="3716397" y="4573590"/>
               <a:ext cx="130428" cy="44175"/>
             </a:xfrm>
             <a:prstGeom prst="rect">
@@ -30084,7 +30084,7 @@
           </p:nvSpPr>
           <p:spPr>
             <a:xfrm>
-              <a:off x="4029928" y="4529415"/>
+              <a:off x="3716397" y="4529415"/>
               <a:ext cx="130428" cy="44175"/>
             </a:xfrm>
             <a:prstGeom prst="rect">
@@ -30119,7 +30119,7 @@
           </p:nvSpPr>
           <p:spPr>
             <a:xfrm>
-              <a:off x="4029928" y="4485240"/>
+              <a:off x="3716397" y="4485240"/>
               <a:ext cx="130428" cy="44175"/>
             </a:xfrm>
             <a:prstGeom prst="rect">
@@ -30154,7 +30154,7 @@
           </p:nvSpPr>
           <p:spPr>
             <a:xfrm>
-              <a:off x="4029928" y="4441065"/>
+              <a:off x="3716397" y="4441065"/>
               <a:ext cx="130428" cy="44175"/>
             </a:xfrm>
             <a:prstGeom prst="rect">
@@ -30189,7 +30189,7 @@
           </p:nvSpPr>
           <p:spPr>
             <a:xfrm>
-              <a:off x="4029928" y="4396890"/>
+              <a:off x="3716397" y="4396890"/>
               <a:ext cx="130428" cy="44175"/>
             </a:xfrm>
             <a:prstGeom prst="rect">
@@ -30224,7 +30224,7 @@
           </p:nvSpPr>
           <p:spPr>
             <a:xfrm>
-              <a:off x="4029928" y="4352715"/>
+              <a:off x="3716397" y="4352715"/>
               <a:ext cx="130428" cy="44175"/>
             </a:xfrm>
             <a:prstGeom prst="rect">
@@ -30259,7 +30259,7 @@
           </p:nvSpPr>
           <p:spPr>
             <a:xfrm>
-              <a:off x="4029928" y="4308540"/>
+              <a:off x="3716397" y="4308540"/>
               <a:ext cx="130428" cy="44175"/>
             </a:xfrm>
             <a:prstGeom prst="rect">
@@ -30294,7 +30294,7 @@
           </p:nvSpPr>
           <p:spPr>
             <a:xfrm>
-              <a:off x="4029928" y="4264365"/>
+              <a:off x="3716397" y="4264365"/>
               <a:ext cx="130428" cy="44175"/>
             </a:xfrm>
             <a:prstGeom prst="rect">
@@ -30329,7 +30329,7 @@
           </p:nvSpPr>
           <p:spPr>
             <a:xfrm>
-              <a:off x="4029928" y="4220190"/>
+              <a:off x="3716397" y="4220190"/>
               <a:ext cx="130428" cy="44175"/>
             </a:xfrm>
             <a:prstGeom prst="rect">
@@ -30364,7 +30364,7 @@
           </p:nvSpPr>
           <p:spPr>
             <a:xfrm>
-              <a:off x="4029928" y="4176015"/>
+              <a:off x="3716397" y="4176015"/>
               <a:ext cx="130428" cy="44175"/>
             </a:xfrm>
             <a:prstGeom prst="rect">
@@ -30399,7 +30399,7 @@
           </p:nvSpPr>
           <p:spPr>
             <a:xfrm>
-              <a:off x="4029928" y="4131840"/>
+              <a:off x="3716397" y="4131840"/>
               <a:ext cx="130428" cy="44175"/>
             </a:xfrm>
             <a:prstGeom prst="rect">
@@ -30434,7 +30434,7 @@
           </p:nvSpPr>
           <p:spPr>
             <a:xfrm>
-              <a:off x="4029928" y="4087665"/>
+              <a:off x="3716397" y="4087665"/>
               <a:ext cx="130428" cy="44175"/>
             </a:xfrm>
             <a:prstGeom prst="rect">
@@ -30469,7 +30469,7 @@
           </p:nvSpPr>
           <p:spPr>
             <a:xfrm>
-              <a:off x="4029928" y="4043490"/>
+              <a:off x="3716397" y="4043490"/>
               <a:ext cx="130428" cy="44175"/>
             </a:xfrm>
             <a:prstGeom prst="rect">
@@ -30504,7 +30504,7 @@
           </p:nvSpPr>
           <p:spPr>
             <a:xfrm>
-              <a:off x="4029928" y="3999315"/>
+              <a:off x="3716397" y="3999315"/>
               <a:ext cx="130428" cy="44175"/>
             </a:xfrm>
             <a:prstGeom prst="rect">
@@ -30539,7 +30539,7 @@
           </p:nvSpPr>
           <p:spPr>
             <a:xfrm>
-              <a:off x="4029928" y="3955140"/>
+              <a:off x="3716397" y="3955140"/>
               <a:ext cx="130428" cy="44175"/>
             </a:xfrm>
             <a:prstGeom prst="rect">
@@ -30574,7 +30574,7 @@
           </p:nvSpPr>
           <p:spPr>
             <a:xfrm>
-              <a:off x="4029928" y="3910965"/>
+              <a:off x="3716397" y="3910965"/>
               <a:ext cx="130428" cy="44175"/>
             </a:xfrm>
             <a:prstGeom prst="rect">
@@ -30609,7 +30609,7 @@
           </p:nvSpPr>
           <p:spPr>
             <a:xfrm>
-              <a:off x="4029928" y="3866790"/>
+              <a:off x="3716397" y="3866790"/>
               <a:ext cx="130428" cy="44175"/>
             </a:xfrm>
             <a:prstGeom prst="rect">
@@ -30644,7 +30644,7 @@
           </p:nvSpPr>
           <p:spPr>
             <a:xfrm>
-              <a:off x="4029928" y="3822615"/>
+              <a:off x="3716397" y="3822615"/>
               <a:ext cx="130428" cy="44175"/>
             </a:xfrm>
             <a:prstGeom prst="rect">
@@ -30679,7 +30679,7 @@
           </p:nvSpPr>
           <p:spPr>
             <a:xfrm>
-              <a:off x="4029928" y="3778440"/>
+              <a:off x="3716397" y="3778440"/>
               <a:ext cx="130428" cy="44175"/>
             </a:xfrm>
             <a:prstGeom prst="rect">
@@ -30714,7 +30714,7 @@
           </p:nvSpPr>
           <p:spPr>
             <a:xfrm>
-              <a:off x="4029928" y="3734265"/>
+              <a:off x="3716397" y="3734265"/>
               <a:ext cx="130428" cy="44175"/>
             </a:xfrm>
             <a:prstGeom prst="rect">
@@ -30749,7 +30749,7 @@
           </p:nvSpPr>
           <p:spPr>
             <a:xfrm>
-              <a:off x="4029928" y="3690090"/>
+              <a:off x="3716397" y="3690090"/>
               <a:ext cx="130428" cy="44175"/>
             </a:xfrm>
             <a:prstGeom prst="rect">
@@ -30784,7 +30784,7 @@
           </p:nvSpPr>
           <p:spPr>
             <a:xfrm>
-              <a:off x="4029928" y="3645915"/>
+              <a:off x="3716397" y="3645915"/>
               <a:ext cx="130428" cy="44175"/>
             </a:xfrm>
             <a:prstGeom prst="rect">
@@ -30819,7 +30819,7 @@
           </p:nvSpPr>
           <p:spPr>
             <a:xfrm>
-              <a:off x="4029928" y="3601740"/>
+              <a:off x="3716397" y="3601740"/>
               <a:ext cx="130428" cy="44175"/>
             </a:xfrm>
             <a:prstGeom prst="rect">
@@ -30854,7 +30854,7 @@
           </p:nvSpPr>
           <p:spPr>
             <a:xfrm>
-              <a:off x="4029928" y="3557565"/>
+              <a:off x="3716397" y="3557565"/>
               <a:ext cx="130428" cy="44175"/>
             </a:xfrm>
             <a:prstGeom prst="rect">
@@ -30889,7 +30889,7 @@
           </p:nvSpPr>
           <p:spPr>
             <a:xfrm>
-              <a:off x="4029928" y="3513390"/>
+              <a:off x="3716397" y="3513390"/>
               <a:ext cx="130428" cy="44175"/>
             </a:xfrm>
             <a:prstGeom prst="rect">
@@ -30924,7 +30924,7 @@
           </p:nvSpPr>
           <p:spPr>
             <a:xfrm>
-              <a:off x="4029928" y="3469215"/>
+              <a:off x="3716397" y="3469215"/>
               <a:ext cx="130428" cy="44175"/>
             </a:xfrm>
             <a:prstGeom prst="rect">
@@ -30959,7 +30959,7 @@
           </p:nvSpPr>
           <p:spPr>
             <a:xfrm>
-              <a:off x="4029928" y="3425040"/>
+              <a:off x="3716397" y="3425040"/>
               <a:ext cx="130428" cy="44175"/>
             </a:xfrm>
             <a:prstGeom prst="rect">
@@ -30994,7 +30994,7 @@
           </p:nvSpPr>
           <p:spPr>
             <a:xfrm>
-              <a:off x="4029928" y="3380865"/>
+              <a:off x="3716397" y="3380865"/>
               <a:ext cx="130428" cy="44175"/>
             </a:xfrm>
             <a:prstGeom prst="rect">
@@ -31029,7 +31029,7 @@
           </p:nvSpPr>
           <p:spPr>
             <a:xfrm>
-              <a:off x="4029928" y="3336690"/>
+              <a:off x="3716397" y="3336690"/>
               <a:ext cx="130428" cy="44175"/>
             </a:xfrm>
             <a:prstGeom prst="rect">
@@ -31064,7 +31064,7 @@
           </p:nvSpPr>
           <p:spPr>
             <a:xfrm>
-              <a:off x="4029928" y="3292515"/>
+              <a:off x="3716397" y="3292515"/>
               <a:ext cx="130428" cy="44175"/>
             </a:xfrm>
             <a:prstGeom prst="rect">
@@ -31099,7 +31099,7 @@
           </p:nvSpPr>
           <p:spPr>
             <a:xfrm>
-              <a:off x="4029928" y="3248340"/>
+              <a:off x="3716397" y="3248340"/>
               <a:ext cx="130428" cy="44175"/>
             </a:xfrm>
             <a:prstGeom prst="rect">
@@ -31134,7 +31134,7 @@
           </p:nvSpPr>
           <p:spPr>
             <a:xfrm>
-              <a:off x="4029928" y="3204165"/>
+              <a:off x="3716397" y="3204165"/>
               <a:ext cx="130428" cy="44175"/>
             </a:xfrm>
             <a:prstGeom prst="rect">
@@ -31169,7 +31169,7 @@
           </p:nvSpPr>
           <p:spPr>
             <a:xfrm>
-              <a:off x="4029928" y="3159990"/>
+              <a:off x="3716397" y="3159990"/>
               <a:ext cx="130428" cy="44175"/>
             </a:xfrm>
             <a:prstGeom prst="rect">
@@ -31204,7 +31204,7 @@
           </p:nvSpPr>
           <p:spPr>
             <a:xfrm>
-              <a:off x="4029928" y="3115815"/>
+              <a:off x="3716397" y="3115815"/>
               <a:ext cx="130428" cy="44175"/>
             </a:xfrm>
             <a:prstGeom prst="rect">
@@ -31239,7 +31239,7 @@
           </p:nvSpPr>
           <p:spPr>
             <a:xfrm>
-              <a:off x="4029928" y="3071640"/>
+              <a:off x="3716397" y="3071640"/>
               <a:ext cx="130428" cy="44175"/>
             </a:xfrm>
             <a:prstGeom prst="rect">
@@ -31274,7 +31274,7 @@
           </p:nvSpPr>
           <p:spPr>
             <a:xfrm>
-              <a:off x="4029928" y="3027465"/>
+              <a:off x="3716397" y="3027465"/>
               <a:ext cx="130428" cy="44175"/>
             </a:xfrm>
             <a:prstGeom prst="rect">
@@ -31309,7 +31309,7 @@
           </p:nvSpPr>
           <p:spPr>
             <a:xfrm>
-              <a:off x="4029928" y="2983290"/>
+              <a:off x="3716397" y="2983290"/>
               <a:ext cx="130428" cy="44175"/>
             </a:xfrm>
             <a:prstGeom prst="rect">
@@ -31344,7 +31344,7 @@
           </p:nvSpPr>
           <p:spPr>
             <a:xfrm>
-              <a:off x="4029928" y="2939115"/>
+              <a:off x="3716397" y="2939115"/>
               <a:ext cx="130428" cy="44175"/>
             </a:xfrm>
             <a:prstGeom prst="rect">
@@ -31379,7 +31379,7 @@
           </p:nvSpPr>
           <p:spPr>
             <a:xfrm>
-              <a:off x="4029928" y="2894940"/>
+              <a:off x="3716397" y="2894940"/>
               <a:ext cx="130428" cy="44175"/>
             </a:xfrm>
             <a:prstGeom prst="rect">
@@ -31414,7 +31414,7 @@
           </p:nvSpPr>
           <p:spPr>
             <a:xfrm>
-              <a:off x="4029928" y="2850765"/>
+              <a:off x="3716397" y="2850765"/>
               <a:ext cx="130428" cy="44175"/>
             </a:xfrm>
             <a:prstGeom prst="rect">
@@ -31449,7 +31449,7 @@
           </p:nvSpPr>
           <p:spPr>
             <a:xfrm>
-              <a:off x="4029928" y="2806590"/>
+              <a:off x="3716397" y="2806590"/>
               <a:ext cx="130428" cy="44175"/>
             </a:xfrm>
             <a:prstGeom prst="rect">
@@ -31484,7 +31484,7 @@
           </p:nvSpPr>
           <p:spPr>
             <a:xfrm>
-              <a:off x="4029928" y="2762415"/>
+              <a:off x="3716397" y="2762415"/>
               <a:ext cx="130428" cy="44175"/>
             </a:xfrm>
             <a:prstGeom prst="rect">
@@ -31519,7 +31519,7 @@
           </p:nvSpPr>
           <p:spPr>
             <a:xfrm>
-              <a:off x="4029928" y="2718240"/>
+              <a:off x="3716397" y="2718240"/>
               <a:ext cx="130428" cy="44175"/>
             </a:xfrm>
             <a:prstGeom prst="rect">
@@ -31554,7 +31554,7 @@
           </p:nvSpPr>
           <p:spPr>
             <a:xfrm>
-              <a:off x="4029928" y="2674065"/>
+              <a:off x="3716397" y="2674065"/>
               <a:ext cx="130428" cy="44175"/>
             </a:xfrm>
             <a:prstGeom prst="rect">
@@ -31589,7 +31589,7 @@
           </p:nvSpPr>
           <p:spPr>
             <a:xfrm>
-              <a:off x="4029928" y="2629890"/>
+              <a:off x="3716397" y="2629890"/>
               <a:ext cx="130428" cy="44175"/>
             </a:xfrm>
             <a:prstGeom prst="rect">
@@ -31624,7 +31624,7 @@
           </p:nvSpPr>
           <p:spPr>
             <a:xfrm>
-              <a:off x="4029928" y="2585715"/>
+              <a:off x="3716397" y="2585715"/>
               <a:ext cx="130428" cy="44175"/>
             </a:xfrm>
             <a:prstGeom prst="rect">
@@ -31659,7 +31659,7 @@
           </p:nvSpPr>
           <p:spPr>
             <a:xfrm>
-              <a:off x="4029928" y="2541540"/>
+              <a:off x="3716397" y="2541540"/>
               <a:ext cx="130428" cy="44175"/>
             </a:xfrm>
             <a:prstGeom prst="rect">
@@ -31694,7 +31694,7 @@
           </p:nvSpPr>
           <p:spPr>
             <a:xfrm>
-              <a:off x="4029928" y="2497365"/>
+              <a:off x="3716397" y="2497365"/>
               <a:ext cx="130428" cy="44175"/>
             </a:xfrm>
             <a:prstGeom prst="rect">
@@ -31729,7 +31729,7 @@
           </p:nvSpPr>
           <p:spPr>
             <a:xfrm>
-              <a:off x="4029928" y="2453190"/>
+              <a:off x="3716397" y="2453190"/>
               <a:ext cx="130428" cy="44175"/>
             </a:xfrm>
             <a:prstGeom prst="rect">
@@ -31764,7 +31764,7 @@
           </p:nvSpPr>
           <p:spPr>
             <a:xfrm>
-              <a:off x="4029928" y="2409015"/>
+              <a:off x="3716397" y="2409015"/>
               <a:ext cx="130428" cy="44175"/>
             </a:xfrm>
             <a:prstGeom prst="rect">
@@ -31799,7 +31799,7 @@
           </p:nvSpPr>
           <p:spPr>
             <a:xfrm>
-              <a:off x="4029928" y="2364840"/>
+              <a:off x="3716397" y="2364840"/>
               <a:ext cx="130428" cy="44175"/>
             </a:xfrm>
             <a:prstGeom prst="rect">
@@ -31834,7 +31834,7 @@
           </p:nvSpPr>
           <p:spPr>
             <a:xfrm>
-              <a:off x="4029928" y="2320665"/>
+              <a:off x="3716397" y="2320665"/>
               <a:ext cx="130428" cy="44175"/>
             </a:xfrm>
             <a:prstGeom prst="rect">
@@ -31869,7 +31869,7 @@
           </p:nvSpPr>
           <p:spPr>
             <a:xfrm>
-              <a:off x="4029928" y="2276490"/>
+              <a:off x="3716397" y="2276490"/>
               <a:ext cx="130428" cy="44175"/>
             </a:xfrm>
             <a:prstGeom prst="rect">
@@ -31904,7 +31904,7 @@
           </p:nvSpPr>
           <p:spPr>
             <a:xfrm>
-              <a:off x="4029928" y="2232315"/>
+              <a:off x="3716397" y="2232315"/>
               <a:ext cx="130428" cy="44175"/>
             </a:xfrm>
             <a:prstGeom prst="rect">
@@ -31939,7 +31939,7 @@
           </p:nvSpPr>
           <p:spPr>
             <a:xfrm>
-              <a:off x="4029928" y="2188140"/>
+              <a:off x="3716397" y="2188140"/>
               <a:ext cx="130428" cy="44175"/>
             </a:xfrm>
             <a:prstGeom prst="rect">
@@ -31974,7 +31974,7 @@
           </p:nvSpPr>
           <p:spPr>
             <a:xfrm>
-              <a:off x="4029928" y="2143965"/>
+              <a:off x="3716397" y="2143965"/>
               <a:ext cx="130428" cy="44175"/>
             </a:xfrm>
             <a:prstGeom prst="rect">
@@ -32009,7 +32009,7 @@
           </p:nvSpPr>
           <p:spPr>
             <a:xfrm>
-              <a:off x="4029928" y="2099790"/>
+              <a:off x="3716397" y="2099790"/>
               <a:ext cx="130428" cy="44175"/>
             </a:xfrm>
             <a:prstGeom prst="rect">
@@ -32044,7 +32044,7 @@
           </p:nvSpPr>
           <p:spPr>
             <a:xfrm>
-              <a:off x="4029928" y="2055615"/>
+              <a:off x="3716397" y="2055615"/>
               <a:ext cx="130428" cy="44175"/>
             </a:xfrm>
             <a:prstGeom prst="rect">
@@ -32079,7 +32079,7 @@
           </p:nvSpPr>
           <p:spPr>
             <a:xfrm>
-              <a:off x="4029928" y="2011440"/>
+              <a:off x="3716397" y="2011440"/>
               <a:ext cx="130428" cy="44175"/>
             </a:xfrm>
             <a:prstGeom prst="rect">
@@ -32114,7 +32114,7 @@
           </p:nvSpPr>
           <p:spPr>
             <a:xfrm>
-              <a:off x="4029928" y="1967265"/>
+              <a:off x="3716397" y="1967265"/>
               <a:ext cx="130428" cy="44175"/>
             </a:xfrm>
             <a:prstGeom prst="rect">
@@ -32149,7 +32149,7 @@
           </p:nvSpPr>
           <p:spPr>
             <a:xfrm>
-              <a:off x="4029928" y="1923090"/>
+              <a:off x="3716397" y="1923090"/>
               <a:ext cx="130428" cy="44175"/>
             </a:xfrm>
             <a:prstGeom prst="rect">
@@ -32184,7 +32184,7 @@
           </p:nvSpPr>
           <p:spPr>
             <a:xfrm>
-              <a:off x="4029928" y="1878915"/>
+              <a:off x="3716397" y="1878915"/>
               <a:ext cx="130428" cy="44175"/>
             </a:xfrm>
             <a:prstGeom prst="rect">
@@ -32219,7 +32219,7 @@
           </p:nvSpPr>
           <p:spPr>
             <a:xfrm>
-              <a:off x="4029928" y="1834740"/>
+              <a:off x="3716397" y="1834740"/>
               <a:ext cx="130428" cy="44175"/>
             </a:xfrm>
             <a:prstGeom prst="rect">
@@ -32254,7 +32254,7 @@
           </p:nvSpPr>
           <p:spPr>
             <a:xfrm>
-              <a:off x="4029928" y="1790565"/>
+              <a:off x="3716397" y="1790565"/>
               <a:ext cx="130428" cy="44175"/>
             </a:xfrm>
             <a:prstGeom prst="rect">
@@ -32289,7 +32289,7 @@
           </p:nvSpPr>
           <p:spPr>
             <a:xfrm>
-              <a:off x="4029928" y="1746390"/>
+              <a:off x="3716397" y="1746390"/>
               <a:ext cx="130428" cy="44175"/>
             </a:xfrm>
             <a:prstGeom prst="rect">
@@ -32324,7 +32324,7 @@
           </p:nvSpPr>
           <p:spPr>
             <a:xfrm>
-              <a:off x="4029928" y="1702215"/>
+              <a:off x="3716397" y="1702215"/>
               <a:ext cx="130428" cy="44175"/>
             </a:xfrm>
             <a:prstGeom prst="rect">
@@ -32359,7 +32359,7 @@
           </p:nvSpPr>
           <p:spPr>
             <a:xfrm>
-              <a:off x="4029928" y="1658040"/>
+              <a:off x="3716397" y="1658040"/>
               <a:ext cx="130428" cy="44175"/>
             </a:xfrm>
             <a:prstGeom prst="rect">
@@ -32394,7 +32394,7 @@
           </p:nvSpPr>
           <p:spPr>
             <a:xfrm>
-              <a:off x="4029928" y="1613865"/>
+              <a:off x="3716397" y="1613865"/>
               <a:ext cx="130428" cy="44175"/>
             </a:xfrm>
             <a:prstGeom prst="rect">
@@ -32429,7 +32429,7 @@
           </p:nvSpPr>
           <p:spPr>
             <a:xfrm>
-              <a:off x="4029928" y="1569690"/>
+              <a:off x="3716397" y="1569690"/>
               <a:ext cx="130428" cy="44175"/>
             </a:xfrm>
             <a:prstGeom prst="rect">
@@ -32464,7 +32464,7 @@
           </p:nvSpPr>
           <p:spPr>
             <a:xfrm>
-              <a:off x="4029928" y="1525515"/>
+              <a:off x="3716397" y="1525515"/>
               <a:ext cx="130428" cy="44175"/>
             </a:xfrm>
             <a:prstGeom prst="rect">
@@ -32499,7 +32499,7 @@
           </p:nvSpPr>
           <p:spPr>
             <a:xfrm>
-              <a:off x="4029928" y="1481340"/>
+              <a:off x="3716397" y="1481340"/>
               <a:ext cx="130428" cy="44175"/>
             </a:xfrm>
             <a:prstGeom prst="rect">
@@ -32534,7 +32534,7 @@
           </p:nvSpPr>
           <p:spPr>
             <a:xfrm>
-              <a:off x="4029928" y="1437165"/>
+              <a:off x="3716397" y="1437165"/>
               <a:ext cx="130428" cy="44175"/>
             </a:xfrm>
             <a:prstGeom prst="rect">
@@ -32569,7 +32569,7 @@
           </p:nvSpPr>
           <p:spPr>
             <a:xfrm>
-              <a:off x="4029928" y="1392990"/>
+              <a:off x="3716397" y="1392990"/>
               <a:ext cx="130428" cy="44175"/>
             </a:xfrm>
             <a:prstGeom prst="rect">
@@ -32604,7 +32604,7 @@
           </p:nvSpPr>
           <p:spPr>
             <a:xfrm>
-              <a:off x="4160356" y="6252241"/>
+              <a:off x="3846826" y="6252241"/>
               <a:ext cx="130428" cy="44175"/>
             </a:xfrm>
             <a:prstGeom prst="rect">
@@ -32639,7 +32639,7 @@
           </p:nvSpPr>
           <p:spPr>
             <a:xfrm>
-              <a:off x="4160356" y="6208066"/>
+              <a:off x="3846826" y="6208066"/>
               <a:ext cx="130428" cy="44175"/>
             </a:xfrm>
             <a:prstGeom prst="rect">
@@ -32674,7 +32674,7 @@
           </p:nvSpPr>
           <p:spPr>
             <a:xfrm>
-              <a:off x="4160356" y="6163891"/>
+              <a:off x="3846826" y="6163891"/>
               <a:ext cx="130428" cy="44175"/>
             </a:xfrm>
             <a:prstGeom prst="rect">
@@ -32709,7 +32709,7 @@
           </p:nvSpPr>
           <p:spPr>
             <a:xfrm>
-              <a:off x="4160356" y="6119716"/>
+              <a:off x="3846826" y="6119716"/>
               <a:ext cx="130428" cy="44175"/>
             </a:xfrm>
             <a:prstGeom prst="rect">
@@ -32744,7 +32744,7 @@
           </p:nvSpPr>
           <p:spPr>
             <a:xfrm>
-              <a:off x="4160356" y="6075541"/>
+              <a:off x="3846826" y="6075541"/>
               <a:ext cx="130428" cy="44175"/>
             </a:xfrm>
             <a:prstGeom prst="rect">
@@ -32779,7 +32779,7 @@
           </p:nvSpPr>
           <p:spPr>
             <a:xfrm>
-              <a:off x="4160356" y="6031366"/>
+              <a:off x="3846826" y="6031366"/>
               <a:ext cx="130428" cy="44175"/>
             </a:xfrm>
             <a:prstGeom prst="rect">
@@ -32814,7 +32814,7 @@
           </p:nvSpPr>
           <p:spPr>
             <a:xfrm>
-              <a:off x="4160356" y="5987191"/>
+              <a:off x="3846826" y="5987191"/>
               <a:ext cx="130428" cy="44175"/>
             </a:xfrm>
             <a:prstGeom prst="rect">
@@ -32849,7 +32849,7 @@
           </p:nvSpPr>
           <p:spPr>
             <a:xfrm>
-              <a:off x="4160356" y="5943016"/>
+              <a:off x="3846826" y="5943016"/>
               <a:ext cx="130428" cy="44175"/>
             </a:xfrm>
             <a:prstGeom prst="rect">
@@ -32884,7 +32884,7 @@
           </p:nvSpPr>
           <p:spPr>
             <a:xfrm>
-              <a:off x="4160356" y="5898841"/>
+              <a:off x="3846826" y="5898841"/>
               <a:ext cx="130428" cy="44175"/>
             </a:xfrm>
             <a:prstGeom prst="rect">
@@ -32919,7 +32919,7 @@
           </p:nvSpPr>
           <p:spPr>
             <a:xfrm>
-              <a:off x="4160356" y="5854666"/>
+              <a:off x="3846826" y="5854666"/>
               <a:ext cx="130428" cy="44175"/>
             </a:xfrm>
             <a:prstGeom prst="rect">
@@ -32954,7 +32954,7 @@
           </p:nvSpPr>
           <p:spPr>
             <a:xfrm>
-              <a:off x="4160356" y="5810491"/>
+              <a:off x="3846826" y="5810491"/>
               <a:ext cx="130428" cy="44175"/>
             </a:xfrm>
             <a:prstGeom prst="rect">
@@ -32989,7 +32989,7 @@
           </p:nvSpPr>
           <p:spPr>
             <a:xfrm>
-              <a:off x="4160356" y="5766316"/>
+              <a:off x="3846826" y="5766316"/>
               <a:ext cx="130428" cy="44175"/>
             </a:xfrm>
             <a:prstGeom prst="rect">
@@ -33024,7 +33024,7 @@
           </p:nvSpPr>
           <p:spPr>
             <a:xfrm>
-              <a:off x="4160356" y="5722141"/>
+              <a:off x="3846826" y="5722141"/>
               <a:ext cx="130428" cy="44175"/>
             </a:xfrm>
             <a:prstGeom prst="rect">
@@ -33059,7 +33059,7 @@
           </p:nvSpPr>
           <p:spPr>
             <a:xfrm>
-              <a:off x="4160356" y="5677966"/>
+              <a:off x="3846826" y="5677966"/>
               <a:ext cx="130428" cy="44175"/>
             </a:xfrm>
             <a:prstGeom prst="rect">
@@ -33094,7 +33094,7 @@
           </p:nvSpPr>
           <p:spPr>
             <a:xfrm>
-              <a:off x="4160356" y="5633791"/>
+              <a:off x="3846826" y="5633791"/>
               <a:ext cx="130428" cy="44175"/>
             </a:xfrm>
             <a:prstGeom prst="rect">
@@ -33129,7 +33129,7 @@
           </p:nvSpPr>
           <p:spPr>
             <a:xfrm>
-              <a:off x="4160356" y="5589616"/>
+              <a:off x="3846826" y="5589616"/>
               <a:ext cx="130428" cy="44175"/>
             </a:xfrm>
             <a:prstGeom prst="rect">
@@ -33164,7 +33164,7 @@
           </p:nvSpPr>
           <p:spPr>
             <a:xfrm>
-              <a:off x="4160356" y="5545441"/>
+              <a:off x="3846826" y="5545441"/>
               <a:ext cx="130428" cy="44175"/>
             </a:xfrm>
             <a:prstGeom prst="rect">
@@ -33199,7 +33199,7 @@
           </p:nvSpPr>
           <p:spPr>
             <a:xfrm>
-              <a:off x="4160356" y="5501266"/>
+              <a:off x="3846826" y="5501266"/>
               <a:ext cx="130428" cy="44175"/>
             </a:xfrm>
             <a:prstGeom prst="rect">
@@ -33234,7 +33234,7 @@
           </p:nvSpPr>
           <p:spPr>
             <a:xfrm>
-              <a:off x="4160356" y="5457091"/>
+              <a:off x="3846826" y="5457091"/>
               <a:ext cx="130428" cy="44175"/>
             </a:xfrm>
             <a:prstGeom prst="rect">
@@ -33269,7 +33269,7 @@
           </p:nvSpPr>
           <p:spPr>
             <a:xfrm>
-              <a:off x="4160356" y="5412916"/>
+              <a:off x="3846826" y="5412916"/>
               <a:ext cx="130428" cy="44175"/>
             </a:xfrm>
             <a:prstGeom prst="rect">
@@ -33304,7 +33304,7 @@
           </p:nvSpPr>
           <p:spPr>
             <a:xfrm>
-              <a:off x="4160356" y="5368741"/>
+              <a:off x="3846826" y="5368741"/>
               <a:ext cx="130428" cy="44175"/>
             </a:xfrm>
             <a:prstGeom prst="rect">
@@ -33339,7 +33339,7 @@
           </p:nvSpPr>
           <p:spPr>
             <a:xfrm>
-              <a:off x="4160356" y="5324566"/>
+              <a:off x="3846826" y="5324566"/>
               <a:ext cx="130428" cy="44175"/>
             </a:xfrm>
             <a:prstGeom prst="rect">
@@ -33374,7 +33374,7 @@
           </p:nvSpPr>
           <p:spPr>
             <a:xfrm>
-              <a:off x="4160356" y="5280391"/>
+              <a:off x="3846826" y="5280391"/>
               <a:ext cx="130428" cy="44175"/>
             </a:xfrm>
             <a:prstGeom prst="rect">
@@ -33409,7 +33409,7 @@
           </p:nvSpPr>
           <p:spPr>
             <a:xfrm>
-              <a:off x="4160356" y="5236216"/>
+              <a:off x="3846826" y="5236216"/>
               <a:ext cx="130428" cy="44175"/>
             </a:xfrm>
             <a:prstGeom prst="rect">
@@ -33444,7 +33444,7 @@
           </p:nvSpPr>
           <p:spPr>
             <a:xfrm>
-              <a:off x="4160356" y="5192041"/>
+              <a:off x="3846826" y="5192041"/>
               <a:ext cx="130428" cy="44175"/>
             </a:xfrm>
             <a:prstGeom prst="rect">
@@ -33479,7 +33479,7 @@
           </p:nvSpPr>
           <p:spPr>
             <a:xfrm>
-              <a:off x="4160356" y="5147866"/>
+              <a:off x="3846826" y="5147866"/>
               <a:ext cx="130428" cy="44175"/>
             </a:xfrm>
             <a:prstGeom prst="rect">
@@ -33514,7 +33514,7 @@
           </p:nvSpPr>
           <p:spPr>
             <a:xfrm>
-              <a:off x="4160356" y="5103691"/>
+              <a:off x="3846826" y="5103691"/>
               <a:ext cx="130428" cy="44175"/>
             </a:xfrm>
             <a:prstGeom prst="rect">
@@ -33549,7 +33549,7 @@
           </p:nvSpPr>
           <p:spPr>
             <a:xfrm>
-              <a:off x="4160356" y="5059516"/>
+              <a:off x="3846826" y="5059516"/>
               <a:ext cx="130428" cy="44175"/>
             </a:xfrm>
             <a:prstGeom prst="rect">
@@ -33584,7 +33584,7 @@
           </p:nvSpPr>
           <p:spPr>
             <a:xfrm>
-              <a:off x="4160356" y="5015341"/>
+              <a:off x="3846826" y="5015341"/>
               <a:ext cx="130428" cy="44175"/>
             </a:xfrm>
             <a:prstGeom prst="rect">
@@ -33619,7 +33619,7 @@
           </p:nvSpPr>
           <p:spPr>
             <a:xfrm>
-              <a:off x="4160356" y="4971166"/>
+              <a:off x="3846826" y="4971166"/>
               <a:ext cx="130428" cy="44175"/>
             </a:xfrm>
             <a:prstGeom prst="rect">
@@ -33654,7 +33654,7 @@
           </p:nvSpPr>
           <p:spPr>
             <a:xfrm>
-              <a:off x="4160356" y="4926991"/>
+              <a:off x="3846826" y="4926991"/>
               <a:ext cx="130428" cy="44175"/>
             </a:xfrm>
             <a:prstGeom prst="rect">
@@ -33689,7 +33689,7 @@
           </p:nvSpPr>
           <p:spPr>
             <a:xfrm>
-              <a:off x="4160356" y="4882816"/>
+              <a:off x="3846826" y="4882816"/>
               <a:ext cx="130428" cy="44175"/>
             </a:xfrm>
             <a:prstGeom prst="rect">
@@ -33724,7 +33724,7 @@
           </p:nvSpPr>
           <p:spPr>
             <a:xfrm>
-              <a:off x="4160356" y="4838641"/>
+              <a:off x="3846826" y="4838641"/>
               <a:ext cx="130428" cy="44175"/>
             </a:xfrm>
             <a:prstGeom prst="rect">
@@ -33759,7 +33759,7 @@
           </p:nvSpPr>
           <p:spPr>
             <a:xfrm>
-              <a:off x="4160356" y="4794466"/>
+              <a:off x="3846826" y="4794466"/>
               <a:ext cx="130428" cy="44175"/>
             </a:xfrm>
             <a:prstGeom prst="rect">
@@ -33794,7 +33794,7 @@
           </p:nvSpPr>
           <p:spPr>
             <a:xfrm>
-              <a:off x="4160356" y="4750290"/>
+              <a:off x="3846826" y="4750290"/>
               <a:ext cx="130428" cy="44175"/>
             </a:xfrm>
             <a:prstGeom prst="rect">
@@ -33829,7 +33829,7 @@
           </p:nvSpPr>
           <p:spPr>
             <a:xfrm>
-              <a:off x="4160356" y="4706115"/>
+              <a:off x="3846826" y="4706115"/>
               <a:ext cx="130428" cy="44175"/>
             </a:xfrm>
             <a:prstGeom prst="rect">
@@ -33864,7 +33864,7 @@
           </p:nvSpPr>
           <p:spPr>
             <a:xfrm>
-              <a:off x="4160356" y="4661940"/>
+              <a:off x="3846826" y="4661940"/>
               <a:ext cx="130428" cy="44175"/>
             </a:xfrm>
             <a:prstGeom prst="rect">
@@ -33899,7 +33899,7 @@
           </p:nvSpPr>
           <p:spPr>
             <a:xfrm>
-              <a:off x="4160356" y="4617765"/>
+              <a:off x="3846826" y="4617765"/>
               <a:ext cx="130428" cy="44175"/>
             </a:xfrm>
             <a:prstGeom prst="rect">
@@ -33934,7 +33934,7 @@
           </p:nvSpPr>
           <p:spPr>
             <a:xfrm>
-              <a:off x="4160356" y="4573590"/>
+              <a:off x="3846826" y="4573590"/>
               <a:ext cx="130428" cy="44175"/>
             </a:xfrm>
             <a:prstGeom prst="rect">
@@ -33969,7 +33969,7 @@
           </p:nvSpPr>
           <p:spPr>
             <a:xfrm>
-              <a:off x="4160356" y="4529415"/>
+              <a:off x="3846826" y="4529415"/>
               <a:ext cx="130428" cy="44175"/>
             </a:xfrm>
             <a:prstGeom prst="rect">
@@ -34004,7 +34004,7 @@
           </p:nvSpPr>
           <p:spPr>
             <a:xfrm>
-              <a:off x="4160356" y="4485240"/>
+              <a:off x="3846826" y="4485240"/>
               <a:ext cx="130428" cy="44175"/>
             </a:xfrm>
             <a:prstGeom prst="rect">
@@ -34039,7 +34039,7 @@
           </p:nvSpPr>
           <p:spPr>
             <a:xfrm>
-              <a:off x="4160356" y="4441065"/>
+              <a:off x="3846826" y="4441065"/>
               <a:ext cx="130428" cy="44175"/>
             </a:xfrm>
             <a:prstGeom prst="rect">
@@ -34074,7 +34074,7 @@
           </p:nvSpPr>
           <p:spPr>
             <a:xfrm>
-              <a:off x="4160356" y="4396890"/>
+              <a:off x="3846826" y="4396890"/>
               <a:ext cx="130428" cy="44175"/>
             </a:xfrm>
             <a:prstGeom prst="rect">
@@ -34109,7 +34109,7 @@
           </p:nvSpPr>
           <p:spPr>
             <a:xfrm>
-              <a:off x="4160356" y="4352715"/>
+              <a:off x="3846826" y="4352715"/>
               <a:ext cx="130428" cy="44175"/>
             </a:xfrm>
             <a:prstGeom prst="rect">
@@ -34144,7 +34144,7 @@
           </p:nvSpPr>
           <p:spPr>
             <a:xfrm>
-              <a:off x="4160356" y="4308540"/>
+              <a:off x="3846826" y="4308540"/>
               <a:ext cx="130428" cy="44175"/>
             </a:xfrm>
             <a:prstGeom prst="rect">
@@ -34179,7 +34179,7 @@
           </p:nvSpPr>
           <p:spPr>
             <a:xfrm>
-              <a:off x="4160356" y="4264365"/>
+              <a:off x="3846826" y="4264365"/>
               <a:ext cx="130428" cy="44175"/>
             </a:xfrm>
             <a:prstGeom prst="rect">
@@ -34214,7 +34214,7 @@
           </p:nvSpPr>
           <p:spPr>
             <a:xfrm>
-              <a:off x="4160356" y="4220190"/>
+              <a:off x="3846826" y="4220190"/>
               <a:ext cx="130428" cy="44175"/>
             </a:xfrm>
             <a:prstGeom prst="rect">
@@ -34249,7 +34249,7 @@
           </p:nvSpPr>
           <p:spPr>
             <a:xfrm>
-              <a:off x="4160356" y="4176015"/>
+              <a:off x="3846826" y="4176015"/>
               <a:ext cx="130428" cy="44175"/>
             </a:xfrm>
             <a:prstGeom prst="rect">
@@ -34284,7 +34284,7 @@
           </p:nvSpPr>
           <p:spPr>
             <a:xfrm>
-              <a:off x="4160356" y="4131840"/>
+              <a:off x="3846826" y="4131840"/>
               <a:ext cx="130428" cy="44175"/>
             </a:xfrm>
             <a:prstGeom prst="rect">
@@ -34319,7 +34319,7 @@
           </p:nvSpPr>
           <p:spPr>
             <a:xfrm>
-              <a:off x="4160356" y="4087665"/>
+              <a:off x="3846826" y="4087665"/>
               <a:ext cx="130428" cy="44175"/>
             </a:xfrm>
             <a:prstGeom prst="rect">
@@ -34354,7 +34354,7 @@
           </p:nvSpPr>
           <p:spPr>
             <a:xfrm>
-              <a:off x="4160356" y="4043490"/>
+              <a:off x="3846826" y="4043490"/>
               <a:ext cx="130428" cy="44175"/>
             </a:xfrm>
             <a:prstGeom prst="rect">
@@ -34389,7 +34389,7 @@
           </p:nvSpPr>
           <p:spPr>
             <a:xfrm>
-              <a:off x="4160356" y="3999315"/>
+              <a:off x="3846826" y="3999315"/>
               <a:ext cx="130428" cy="44175"/>
             </a:xfrm>
             <a:prstGeom prst="rect">
@@ -34424,7 +34424,7 @@
           </p:nvSpPr>
           <p:spPr>
             <a:xfrm>
-              <a:off x="4160356" y="3955140"/>
+              <a:off x="3846826" y="3955140"/>
               <a:ext cx="130428" cy="44175"/>
             </a:xfrm>
             <a:prstGeom prst="rect">
@@ -34459,7 +34459,7 @@
           </p:nvSpPr>
           <p:spPr>
             <a:xfrm>
-              <a:off x="4160356" y="3910965"/>
+              <a:off x="3846826" y="3910965"/>
               <a:ext cx="130428" cy="44175"/>
             </a:xfrm>
             <a:prstGeom prst="rect">
@@ -34494,7 +34494,7 @@
           </p:nvSpPr>
           <p:spPr>
             <a:xfrm>
-              <a:off x="4160356" y="3866790"/>
+              <a:off x="3846826" y="3866790"/>
               <a:ext cx="130428" cy="44175"/>
             </a:xfrm>
             <a:prstGeom prst="rect">
@@ -34529,7 +34529,7 @@
           </p:nvSpPr>
           <p:spPr>
             <a:xfrm>
-              <a:off x="4160356" y="3822615"/>
+              <a:off x="3846826" y="3822615"/>
               <a:ext cx="130428" cy="44175"/>
             </a:xfrm>
             <a:prstGeom prst="rect">
@@ -34564,7 +34564,7 @@
           </p:nvSpPr>
           <p:spPr>
             <a:xfrm>
-              <a:off x="4160356" y="3778440"/>
+              <a:off x="3846826" y="3778440"/>
               <a:ext cx="130428" cy="44175"/>
             </a:xfrm>
             <a:prstGeom prst="rect">
@@ -34599,7 +34599,7 @@
           </p:nvSpPr>
           <p:spPr>
             <a:xfrm>
-              <a:off x="4160356" y="3734265"/>
+              <a:off x="3846826" y="3734265"/>
               <a:ext cx="130428" cy="44175"/>
             </a:xfrm>
             <a:prstGeom prst="rect">
@@ -34634,7 +34634,7 @@
           </p:nvSpPr>
           <p:spPr>
             <a:xfrm>
-              <a:off x="4160356" y="3690090"/>
+              <a:off x="3846826" y="3690090"/>
               <a:ext cx="130428" cy="44175"/>
             </a:xfrm>
             <a:prstGeom prst="rect">
@@ -34669,7 +34669,7 @@
           </p:nvSpPr>
           <p:spPr>
             <a:xfrm>
-              <a:off x="4160356" y="3645915"/>
+              <a:off x="3846826" y="3645915"/>
               <a:ext cx="130428" cy="44175"/>
             </a:xfrm>
             <a:prstGeom prst="rect">
@@ -34704,7 +34704,7 @@
           </p:nvSpPr>
           <p:spPr>
             <a:xfrm>
-              <a:off x="4160356" y="3601740"/>
+              <a:off x="3846826" y="3601740"/>
               <a:ext cx="130428" cy="44175"/>
             </a:xfrm>
             <a:prstGeom prst="rect">
@@ -34739,7 +34739,7 @@
           </p:nvSpPr>
           <p:spPr>
             <a:xfrm>
-              <a:off x="4160356" y="3557565"/>
+              <a:off x="3846826" y="3557565"/>
               <a:ext cx="130428" cy="44175"/>
             </a:xfrm>
             <a:prstGeom prst="rect">
@@ -34774,7 +34774,7 @@
           </p:nvSpPr>
           <p:spPr>
             <a:xfrm>
-              <a:off x="4160356" y="3513390"/>
+              <a:off x="3846826" y="3513390"/>
               <a:ext cx="130428" cy="44175"/>
             </a:xfrm>
             <a:prstGeom prst="rect">
@@ -34809,7 +34809,7 @@
           </p:nvSpPr>
           <p:spPr>
             <a:xfrm>
-              <a:off x="4160356" y="3469215"/>
+              <a:off x="3846826" y="3469215"/>
               <a:ext cx="130428" cy="44175"/>
             </a:xfrm>
             <a:prstGeom prst="rect">
@@ -34844,7 +34844,7 @@
           </p:nvSpPr>
           <p:spPr>
             <a:xfrm>
-              <a:off x="4160356" y="3425040"/>
+              <a:off x="3846826" y="3425040"/>
               <a:ext cx="130428" cy="44175"/>
             </a:xfrm>
             <a:prstGeom prst="rect">
@@ -34879,7 +34879,7 @@
           </p:nvSpPr>
           <p:spPr>
             <a:xfrm>
-              <a:off x="4160356" y="3380865"/>
+              <a:off x="3846826" y="3380865"/>
               <a:ext cx="130428" cy="44175"/>
             </a:xfrm>
             <a:prstGeom prst="rect">
@@ -34914,7 +34914,7 @@
           </p:nvSpPr>
           <p:spPr>
             <a:xfrm>
-              <a:off x="4160356" y="3336690"/>
+              <a:off x="3846826" y="3336690"/>
               <a:ext cx="130428" cy="44175"/>
             </a:xfrm>
             <a:prstGeom prst="rect">
@@ -34949,7 +34949,7 @@
           </p:nvSpPr>
           <p:spPr>
             <a:xfrm>
-              <a:off x="4160356" y="3292515"/>
+              <a:off x="3846826" y="3292515"/>
               <a:ext cx="130428" cy="44175"/>
             </a:xfrm>
             <a:prstGeom prst="rect">
@@ -34984,7 +34984,7 @@
           </p:nvSpPr>
           <p:spPr>
             <a:xfrm>
-              <a:off x="4160356" y="3248340"/>
+              <a:off x="3846826" y="3248340"/>
               <a:ext cx="130428" cy="44175"/>
             </a:xfrm>
             <a:prstGeom prst="rect">
@@ -35019,7 +35019,7 @@
           </p:nvSpPr>
           <p:spPr>
             <a:xfrm>
-              <a:off x="4160356" y="3204165"/>
+              <a:off x="3846826" y="3204165"/>
               <a:ext cx="130428" cy="44175"/>
             </a:xfrm>
             <a:prstGeom prst="rect">
@@ -35054,7 +35054,7 @@
           </p:nvSpPr>
           <p:spPr>
             <a:xfrm>
-              <a:off x="4160356" y="3159990"/>
+              <a:off x="3846826" y="3159990"/>
               <a:ext cx="130428" cy="44175"/>
             </a:xfrm>
             <a:prstGeom prst="rect">
@@ -35089,7 +35089,7 @@
           </p:nvSpPr>
           <p:spPr>
             <a:xfrm>
-              <a:off x="4160356" y="3115815"/>
+              <a:off x="3846826" y="3115815"/>
               <a:ext cx="130428" cy="44175"/>
             </a:xfrm>
             <a:prstGeom prst="rect">
@@ -35124,7 +35124,7 @@
           </p:nvSpPr>
           <p:spPr>
             <a:xfrm>
-              <a:off x="4160356" y="3071640"/>
+              <a:off x="3846826" y="3071640"/>
               <a:ext cx="130428" cy="44175"/>
             </a:xfrm>
             <a:prstGeom prst="rect">
@@ -35159,7 +35159,7 @@
           </p:nvSpPr>
           <p:spPr>
             <a:xfrm>
-              <a:off x="4160356" y="3027465"/>
+              <a:off x="3846826" y="3027465"/>
               <a:ext cx="130428" cy="44175"/>
             </a:xfrm>
             <a:prstGeom prst="rect">
@@ -35194,7 +35194,7 @@
           </p:nvSpPr>
           <p:spPr>
             <a:xfrm>
-              <a:off x="4160356" y="2983290"/>
+              <a:off x="3846826" y="2983290"/>
               <a:ext cx="130428" cy="44175"/>
             </a:xfrm>
             <a:prstGeom prst="rect">
@@ -35229,7 +35229,7 @@
           </p:nvSpPr>
           <p:spPr>
             <a:xfrm>
-              <a:off x="4160356" y="2939115"/>
+              <a:off x="3846826" y="2939115"/>
               <a:ext cx="130428" cy="44175"/>
             </a:xfrm>
             <a:prstGeom prst="rect">
@@ -35264,7 +35264,7 @@
           </p:nvSpPr>
           <p:spPr>
             <a:xfrm>
-              <a:off x="4160356" y="2894940"/>
+              <a:off x="3846826" y="2894940"/>
               <a:ext cx="130428" cy="44175"/>
             </a:xfrm>
             <a:prstGeom prst="rect">
@@ -35299,7 +35299,7 @@
           </p:nvSpPr>
           <p:spPr>
             <a:xfrm>
-              <a:off x="4160356" y="2850765"/>
+              <a:off x="3846826" y="2850765"/>
               <a:ext cx="130428" cy="44175"/>
             </a:xfrm>
             <a:prstGeom prst="rect">
@@ -35334,7 +35334,7 @@
           </p:nvSpPr>
           <p:spPr>
             <a:xfrm>
-              <a:off x="4160356" y="2806590"/>
+              <a:off x="3846826" y="2806590"/>
               <a:ext cx="130428" cy="44175"/>
             </a:xfrm>
             <a:prstGeom prst="rect">
@@ -35369,7 +35369,7 @@
           </p:nvSpPr>
           <p:spPr>
             <a:xfrm>
-              <a:off x="4160356" y="2762415"/>
+              <a:off x="3846826" y="2762415"/>
               <a:ext cx="130428" cy="44175"/>
             </a:xfrm>
             <a:prstGeom prst="rect">
@@ -35404,7 +35404,7 @@
           </p:nvSpPr>
           <p:spPr>
             <a:xfrm>
-              <a:off x="4160356" y="2718240"/>
+              <a:off x="3846826" y="2718240"/>
               <a:ext cx="130428" cy="44175"/>
             </a:xfrm>
             <a:prstGeom prst="rect">
@@ -35439,7 +35439,7 @@
           </p:nvSpPr>
           <p:spPr>
             <a:xfrm>
-              <a:off x="4160356" y="2674065"/>
+              <a:off x="3846826" y="2674065"/>
               <a:ext cx="130428" cy="44175"/>
             </a:xfrm>
             <a:prstGeom prst="rect">
@@ -35474,7 +35474,7 @@
           </p:nvSpPr>
           <p:spPr>
             <a:xfrm>
-              <a:off x="4160356" y="2629890"/>
+              <a:off x="3846826" y="2629890"/>
               <a:ext cx="130428" cy="44175"/>
             </a:xfrm>
             <a:prstGeom prst="rect">
@@ -35509,7 +35509,7 @@
           </p:nvSpPr>
           <p:spPr>
             <a:xfrm>
-              <a:off x="4160356" y="2585715"/>
+              <a:off x="3846826" y="2585715"/>
               <a:ext cx="130428" cy="44175"/>
             </a:xfrm>
             <a:prstGeom prst="rect">
@@ -35544,7 +35544,7 @@
           </p:nvSpPr>
           <p:spPr>
             <a:xfrm>
-              <a:off x="4160356" y="2541540"/>
+              <a:off x="3846826" y="2541540"/>
               <a:ext cx="130428" cy="44175"/>
             </a:xfrm>
             <a:prstGeom prst="rect">
@@ -35579,7 +35579,7 @@
           </p:nvSpPr>
           <p:spPr>
             <a:xfrm>
-              <a:off x="4160356" y="2497365"/>
+              <a:off x="3846826" y="2497365"/>
               <a:ext cx="130428" cy="44175"/>
             </a:xfrm>
             <a:prstGeom prst="rect">
@@ -35614,7 +35614,7 @@
           </p:nvSpPr>
           <p:spPr>
             <a:xfrm>
-              <a:off x="4160356" y="2453190"/>
+              <a:off x="3846826" y="2453190"/>
               <a:ext cx="130428" cy="44175"/>
             </a:xfrm>
             <a:prstGeom prst="rect">
@@ -35649,7 +35649,7 @@
           </p:nvSpPr>
           <p:spPr>
             <a:xfrm>
-              <a:off x="4160356" y="2409015"/>
+              <a:off x="3846826" y="2409015"/>
               <a:ext cx="130428" cy="44175"/>
             </a:xfrm>
             <a:prstGeom prst="rect">
@@ -35684,7 +35684,7 @@
           </p:nvSpPr>
           <p:spPr>
             <a:xfrm>
-              <a:off x="4160356" y="2364840"/>
+              <a:off x="3846826" y="2364840"/>
               <a:ext cx="130428" cy="44175"/>
             </a:xfrm>
             <a:prstGeom prst="rect">
@@ -35719,7 +35719,7 @@
           </p:nvSpPr>
           <p:spPr>
             <a:xfrm>
-              <a:off x="4160356" y="2320665"/>
+              <a:off x="3846826" y="2320665"/>
               <a:ext cx="130428" cy="44175"/>
             </a:xfrm>
             <a:prstGeom prst="rect">
@@ -35754,7 +35754,7 @@
           </p:nvSpPr>
           <p:spPr>
             <a:xfrm>
-              <a:off x="4160356" y="2276490"/>
+              <a:off x="3846826" y="2276490"/>
               <a:ext cx="130428" cy="44175"/>
             </a:xfrm>
             <a:prstGeom prst="rect">
@@ -35789,7 +35789,7 @@
           </p:nvSpPr>
           <p:spPr>
             <a:xfrm>
-              <a:off x="4160356" y="2232315"/>
+              <a:off x="3846826" y="2232315"/>
               <a:ext cx="130428" cy="44175"/>
             </a:xfrm>
             <a:prstGeom prst="rect">
@@ -35824,7 +35824,7 @@
           </p:nvSpPr>
           <p:spPr>
             <a:xfrm>
-              <a:off x="4160356" y="2188140"/>
+              <a:off x="3846826" y="2188140"/>
               <a:ext cx="130428" cy="44175"/>
             </a:xfrm>
             <a:prstGeom prst="rect">
@@ -35859,7 +35859,7 @@
           </p:nvSpPr>
           <p:spPr>
             <a:xfrm>
-              <a:off x="4160356" y="2143965"/>
+              <a:off x="3846826" y="2143965"/>
               <a:ext cx="130428" cy="44175"/>
             </a:xfrm>
             <a:prstGeom prst="rect">
@@ -35894,7 +35894,7 @@
           </p:nvSpPr>
           <p:spPr>
             <a:xfrm>
-              <a:off x="4160356" y="2099790"/>
+              <a:off x="3846826" y="2099790"/>
               <a:ext cx="130428" cy="44175"/>
             </a:xfrm>
             <a:prstGeom prst="rect">
@@ -35929,7 +35929,7 @@
           </p:nvSpPr>
           <p:spPr>
             <a:xfrm>
-              <a:off x="4160356" y="2055615"/>
+              <a:off x="3846826" y="2055615"/>
               <a:ext cx="130428" cy="44175"/>
             </a:xfrm>
             <a:prstGeom prst="rect">
@@ -35964,7 +35964,7 @@
           </p:nvSpPr>
           <p:spPr>
             <a:xfrm>
-              <a:off x="4160356" y="2011440"/>
+              <a:off x="3846826" y="2011440"/>
               <a:ext cx="130428" cy="44175"/>
             </a:xfrm>
             <a:prstGeom prst="rect">
@@ -35999,7 +35999,7 @@
           </p:nvSpPr>
           <p:spPr>
             <a:xfrm>
-              <a:off x="4160356" y="1967265"/>
+              <a:off x="3846826" y="1967265"/>
               <a:ext cx="130428" cy="44175"/>
             </a:xfrm>
             <a:prstGeom prst="rect">
@@ -36034,7 +36034,7 @@
           </p:nvSpPr>
           <p:spPr>
             <a:xfrm>
-              <a:off x="4160356" y="1923090"/>
+              <a:off x="3846826" y="1923090"/>
               <a:ext cx="130428" cy="44175"/>
             </a:xfrm>
             <a:prstGeom prst="rect">
@@ -36069,7 +36069,7 @@
           </p:nvSpPr>
           <p:spPr>
             <a:xfrm>
-              <a:off x="4160356" y="1878915"/>
+              <a:off x="3846826" y="1878915"/>
               <a:ext cx="130428" cy="44175"/>
             </a:xfrm>
             <a:prstGeom prst="rect">
@@ -36104,7 +36104,7 @@
           </p:nvSpPr>
           <p:spPr>
             <a:xfrm>
-              <a:off x="4160356" y="1834740"/>
+              <a:off x="3846826" y="1834740"/>
               <a:ext cx="130428" cy="44175"/>
             </a:xfrm>
             <a:prstGeom prst="rect">
@@ -36139,7 +36139,7 @@
           </p:nvSpPr>
           <p:spPr>
             <a:xfrm>
-              <a:off x="4160356" y="1790565"/>
+              <a:off x="3846826" y="1790565"/>
               <a:ext cx="130428" cy="44175"/>
             </a:xfrm>
             <a:prstGeom prst="rect">
@@ -36174,7 +36174,7 @@
           </p:nvSpPr>
           <p:spPr>
             <a:xfrm>
-              <a:off x="4160356" y="1746390"/>
+              <a:off x="3846826" y="1746390"/>
               <a:ext cx="130428" cy="44175"/>
             </a:xfrm>
             <a:prstGeom prst="rect">
@@ -36209,7 +36209,7 @@
           </p:nvSpPr>
           <p:spPr>
             <a:xfrm>
-              <a:off x="4160356" y="1702215"/>
+              <a:off x="3846826" y="1702215"/>
               <a:ext cx="130428" cy="44175"/>
             </a:xfrm>
             <a:prstGeom prst="rect">
@@ -36244,7 +36244,7 @@
           </p:nvSpPr>
           <p:spPr>
             <a:xfrm>
-              <a:off x="4160356" y="1658040"/>
+              <a:off x="3846826" y="1658040"/>
               <a:ext cx="130428" cy="44175"/>
             </a:xfrm>
             <a:prstGeom prst="rect">
@@ -36279,7 +36279,7 @@
           </p:nvSpPr>
           <p:spPr>
             <a:xfrm>
-              <a:off x="4160356" y="1613865"/>
+              <a:off x="3846826" y="1613865"/>
               <a:ext cx="130428" cy="44175"/>
             </a:xfrm>
             <a:prstGeom prst="rect">
@@ -36314,7 +36314,7 @@
           </p:nvSpPr>
           <p:spPr>
             <a:xfrm>
-              <a:off x="4160356" y="1569690"/>
+              <a:off x="3846826" y="1569690"/>
               <a:ext cx="130428" cy="44175"/>
             </a:xfrm>
             <a:prstGeom prst="rect">
@@ -36349,7 +36349,7 @@
           </p:nvSpPr>
           <p:spPr>
             <a:xfrm>
-              <a:off x="4160356" y="1525515"/>
+              <a:off x="3846826" y="1525515"/>
               <a:ext cx="130428" cy="44175"/>
             </a:xfrm>
             <a:prstGeom prst="rect">
@@ -36384,7 +36384,7 @@
           </p:nvSpPr>
           <p:spPr>
             <a:xfrm>
-              <a:off x="4160356" y="1481340"/>
+              <a:off x="3846826" y="1481340"/>
               <a:ext cx="130428" cy="44175"/>
             </a:xfrm>
             <a:prstGeom prst="rect">
@@ -36419,7 +36419,7 @@
           </p:nvSpPr>
           <p:spPr>
             <a:xfrm>
-              <a:off x="4160356" y="1437165"/>
+              <a:off x="3846826" y="1437165"/>
               <a:ext cx="130428" cy="44175"/>
             </a:xfrm>
             <a:prstGeom prst="rect">
@@ -36454,7 +36454,7 @@
           </p:nvSpPr>
           <p:spPr>
             <a:xfrm>
-              <a:off x="4160356" y="1392990"/>
+              <a:off x="3846826" y="1392990"/>
               <a:ext cx="130428" cy="44175"/>
             </a:xfrm>
             <a:prstGeom prst="rect">
@@ -36489,7 +36489,7 @@
           </p:nvSpPr>
           <p:spPr>
             <a:xfrm>
-              <a:off x="4290785" y="6252241"/>
+              <a:off x="3977254" y="6252241"/>
               <a:ext cx="130428" cy="44175"/>
             </a:xfrm>
             <a:prstGeom prst="rect">
@@ -36524,7 +36524,7 @@
           </p:nvSpPr>
           <p:spPr>
             <a:xfrm>
-              <a:off x="4290785" y="6208066"/>
+              <a:off x="3977254" y="6208066"/>
               <a:ext cx="130428" cy="44175"/>
             </a:xfrm>
             <a:prstGeom prst="rect">
@@ -36559,7 +36559,7 @@
           </p:nvSpPr>
           <p:spPr>
             <a:xfrm>
-              <a:off x="4290785" y="6163891"/>
+              <a:off x="3977254" y="6163891"/>
               <a:ext cx="130428" cy="44175"/>
             </a:xfrm>
             <a:prstGeom prst="rect">
@@ -36594,7 +36594,7 @@
           </p:nvSpPr>
           <p:spPr>
             <a:xfrm>
-              <a:off x="4290785" y="6119716"/>
+              <a:off x="3977254" y="6119716"/>
               <a:ext cx="130428" cy="44175"/>
             </a:xfrm>
             <a:prstGeom prst="rect">
@@ -36629,7 +36629,7 @@
           </p:nvSpPr>
           <p:spPr>
             <a:xfrm>
-              <a:off x="4290785" y="6075541"/>
+              <a:off x="3977254" y="6075541"/>
               <a:ext cx="130428" cy="44175"/>
             </a:xfrm>
             <a:prstGeom prst="rect">
@@ -36664,7 +36664,7 @@
           </p:nvSpPr>
           <p:spPr>
             <a:xfrm>
-              <a:off x="4290785" y="6031366"/>
+              <a:off x="3977254" y="6031366"/>
               <a:ext cx="130428" cy="44175"/>
             </a:xfrm>
             <a:prstGeom prst="rect">
@@ -36699,7 +36699,7 @@
           </p:nvSpPr>
           <p:spPr>
             <a:xfrm>
-              <a:off x="4290785" y="5987191"/>
+              <a:off x="3977254" y="5987191"/>
               <a:ext cx="130428" cy="44175"/>
             </a:xfrm>
             <a:prstGeom prst="rect">
@@ -36734,7 +36734,7 @@
           </p:nvSpPr>
           <p:spPr>
             <a:xfrm>
-              <a:off x="4290785" y="5943016"/>
+              <a:off x="3977254" y="5943016"/>
               <a:ext cx="130428" cy="44175"/>
             </a:xfrm>
             <a:prstGeom prst="rect">
@@ -36769,7 +36769,7 @@
           </p:nvSpPr>
           <p:spPr>
             <a:xfrm>
-              <a:off x="4290785" y="5898841"/>
+              <a:off x="3977254" y="5898841"/>
               <a:ext cx="130428" cy="44175"/>
             </a:xfrm>
             <a:prstGeom prst="rect">
@@ -36804,7 +36804,7 @@
           </p:nvSpPr>
           <p:spPr>
             <a:xfrm>
-              <a:off x="4290785" y="5854666"/>
+              <a:off x="3977254" y="5854666"/>
               <a:ext cx="130428" cy="44175"/>
             </a:xfrm>
             <a:prstGeom prst="rect">
@@ -36839,7 +36839,7 @@
           </p:nvSpPr>
           <p:spPr>
             <a:xfrm>
-              <a:off x="4290785" y="5810491"/>
+              <a:off x="3977254" y="5810491"/>
               <a:ext cx="130428" cy="44175"/>
             </a:xfrm>
             <a:prstGeom prst="rect">
@@ -36874,7 +36874,7 @@
           </p:nvSpPr>
           <p:spPr>
             <a:xfrm>
-              <a:off x="4290785" y="5766316"/>
+              <a:off x="3977254" y="5766316"/>
               <a:ext cx="130428" cy="44175"/>
             </a:xfrm>
             <a:prstGeom prst="rect">
@@ -36909,7 +36909,7 @@
           </p:nvSpPr>
           <p:spPr>
             <a:xfrm>
-              <a:off x="4290785" y="5722141"/>
+              <a:off x="3977254" y="5722141"/>
               <a:ext cx="130428" cy="44175"/>
             </a:xfrm>
             <a:prstGeom prst="rect">
@@ -36944,7 +36944,7 @@
           </p:nvSpPr>
           <p:spPr>
             <a:xfrm>
-              <a:off x="4290785" y="5677966"/>
+              <a:off x="3977254" y="5677966"/>
               <a:ext cx="130428" cy="44175"/>
             </a:xfrm>
             <a:prstGeom prst="rect">
@@ -36979,7 +36979,7 @@
           </p:nvSpPr>
           <p:spPr>
             <a:xfrm>
-              <a:off x="4290785" y="5633791"/>
+              <a:off x="3977254" y="5633791"/>
               <a:ext cx="130428" cy="44175"/>
             </a:xfrm>
             <a:prstGeom prst="rect">
@@ -37014,7 +37014,7 @@
           </p:nvSpPr>
           <p:spPr>
             <a:xfrm>
-              <a:off x="4290785" y="5589616"/>
+              <a:off x="3977254" y="5589616"/>
               <a:ext cx="130428" cy="44175"/>
             </a:xfrm>
             <a:prstGeom prst="rect">
@@ -37049,7 +37049,7 @@
           </p:nvSpPr>
           <p:spPr>
             <a:xfrm>
-              <a:off x="4290785" y="5545441"/>
+              <a:off x="3977254" y="5545441"/>
               <a:ext cx="130428" cy="44175"/>
             </a:xfrm>
             <a:prstGeom prst="rect">
@@ -37084,7 +37084,7 @@
           </p:nvSpPr>
           <p:spPr>
             <a:xfrm>
-              <a:off x="4290785" y="5501266"/>
+              <a:off x="3977254" y="5501266"/>
               <a:ext cx="130428" cy="44175"/>
             </a:xfrm>
             <a:prstGeom prst="rect">
@@ -37119,7 +37119,7 @@
           </p:nvSpPr>
           <p:spPr>
             <a:xfrm>
-              <a:off x="4290785" y="5457091"/>
+              <a:off x="3977254" y="5457091"/>
               <a:ext cx="130428" cy="44175"/>
             </a:xfrm>
             <a:prstGeom prst="rect">
@@ -37154,7 +37154,7 @@
           </p:nvSpPr>
           <p:spPr>
             <a:xfrm>
-              <a:off x="4290785" y="5412916"/>
+              <a:off x="3977254" y="5412916"/>
               <a:ext cx="130428" cy="44175"/>
             </a:xfrm>
             <a:prstGeom prst="rect">
@@ -37189,7 +37189,7 @@
           </p:nvSpPr>
           <p:spPr>
             <a:xfrm>
-              <a:off x="4290785" y="5368741"/>
+              <a:off x="3977254" y="5368741"/>
               <a:ext cx="130428" cy="44175"/>
             </a:xfrm>
             <a:prstGeom prst="rect">
@@ -37224,7 +37224,7 @@
           </p:nvSpPr>
           <p:spPr>
             <a:xfrm>
-              <a:off x="4290785" y="5324566"/>
+              <a:off x="3977254" y="5324566"/>
               <a:ext cx="130428" cy="44175"/>
             </a:xfrm>
             <a:prstGeom prst="rect">
@@ -37259,7 +37259,7 @@
           </p:nvSpPr>
           <p:spPr>
             <a:xfrm>
-              <a:off x="4290785" y="5280391"/>
+              <a:off x="3977254" y="5280391"/>
               <a:ext cx="130428" cy="44175"/>
             </a:xfrm>
             <a:prstGeom prst="rect">
@@ -37294,7 +37294,7 @@
           </p:nvSpPr>
           <p:spPr>
             <a:xfrm>
-              <a:off x="4290785" y="5236216"/>
+              <a:off x="3977254" y="5236216"/>
               <a:ext cx="130428" cy="44175"/>
             </a:xfrm>
             <a:prstGeom prst="rect">
@@ -37329,7 +37329,7 @@
           </p:nvSpPr>
           <p:spPr>
             <a:xfrm>
-              <a:off x="4290785" y="5192041"/>
+              <a:off x="3977254" y="5192041"/>
               <a:ext cx="130428" cy="44175"/>
             </a:xfrm>
             <a:prstGeom prst="rect">
@@ -37364,7 +37364,7 @@
           </p:nvSpPr>
           <p:spPr>
             <a:xfrm>
-              <a:off x="4290785" y="5147866"/>
+              <a:off x="3977254" y="5147866"/>
               <a:ext cx="130428" cy="44175"/>
             </a:xfrm>
             <a:prstGeom prst="rect">
@@ -37399,7 +37399,7 @@
           </p:nvSpPr>
           <p:spPr>
             <a:xfrm>
-              <a:off x="4290785" y="5103691"/>
+              <a:off x="3977254" y="5103691"/>
               <a:ext cx="130428" cy="44175"/>
             </a:xfrm>
             <a:prstGeom prst="rect">
@@ -37434,7 +37434,7 @@
           </p:nvSpPr>
           <p:spPr>
             <a:xfrm>
-              <a:off x="4290785" y="5059516"/>
+              <a:off x="3977254" y="5059516"/>
               <a:ext cx="130428" cy="44175"/>
             </a:xfrm>
             <a:prstGeom prst="rect">
@@ -37469,7 +37469,7 @@
           </p:nvSpPr>
           <p:spPr>
             <a:xfrm>
-              <a:off x="4290785" y="5015341"/>
+              <a:off x="3977254" y="5015341"/>
               <a:ext cx="130428" cy="44175"/>
             </a:xfrm>
             <a:prstGeom prst="rect">
@@ -37504,7 +37504,7 @@
           </p:nvSpPr>
           <p:spPr>
             <a:xfrm>
-              <a:off x="4290785" y="4971166"/>
+              <a:off x="3977254" y="4971166"/>
               <a:ext cx="130428" cy="44175"/>
             </a:xfrm>
             <a:prstGeom prst="rect">
@@ -37539,7 +37539,7 @@
           </p:nvSpPr>
           <p:spPr>
             <a:xfrm>
-              <a:off x="4290785" y="4926991"/>
+              <a:off x="3977254" y="4926991"/>
               <a:ext cx="130428" cy="44175"/>
             </a:xfrm>
             <a:prstGeom prst="rect">
@@ -37574,7 +37574,7 @@
           </p:nvSpPr>
           <p:spPr>
             <a:xfrm>
-              <a:off x="4290785" y="4882816"/>
+              <a:off x="3977254" y="4882816"/>
               <a:ext cx="130428" cy="44175"/>
             </a:xfrm>
             <a:prstGeom prst="rect">
@@ -37609,7 +37609,7 @@
           </p:nvSpPr>
           <p:spPr>
             <a:xfrm>
-              <a:off x="4290785" y="4838641"/>
+              <a:off x="3977254" y="4838641"/>
               <a:ext cx="130428" cy="44175"/>
             </a:xfrm>
             <a:prstGeom prst="rect">
@@ -37644,7 +37644,7 @@
           </p:nvSpPr>
           <p:spPr>
             <a:xfrm>
-              <a:off x="4290785" y="4794466"/>
+              <a:off x="3977254" y="4794466"/>
               <a:ext cx="130428" cy="44175"/>
             </a:xfrm>
             <a:prstGeom prst="rect">
@@ -37679,7 +37679,7 @@
           </p:nvSpPr>
           <p:spPr>
             <a:xfrm>
-              <a:off x="4290785" y="4750290"/>
+              <a:off x="3977254" y="4750290"/>
               <a:ext cx="130428" cy="44175"/>
             </a:xfrm>
             <a:prstGeom prst="rect">
@@ -37714,7 +37714,7 @@
           </p:nvSpPr>
           <p:spPr>
             <a:xfrm>
-              <a:off x="4290785" y="4706115"/>
+              <a:off x="3977254" y="4706115"/>
               <a:ext cx="130428" cy="44175"/>
             </a:xfrm>
             <a:prstGeom prst="rect">
@@ -37749,7 +37749,7 @@
           </p:nvSpPr>
           <p:spPr>
             <a:xfrm>
-              <a:off x="4290785" y="4661940"/>
+              <a:off x="3977254" y="4661940"/>
               <a:ext cx="130428" cy="44175"/>
             </a:xfrm>
             <a:prstGeom prst="rect">
@@ -37784,7 +37784,7 @@
           </p:nvSpPr>
           <p:spPr>
             <a:xfrm>
-              <a:off x="4290785" y="4617765"/>
+              <a:off x="3977254" y="4617765"/>
               <a:ext cx="130428" cy="44175"/>
             </a:xfrm>
             <a:prstGeom prst="rect">
@@ -37819,7 +37819,7 @@
           </p:nvSpPr>
           <p:spPr>
             <a:xfrm>
-              <a:off x="4290785" y="4573590"/>
+              <a:off x="3977254" y="4573590"/>
               <a:ext cx="130428" cy="44175"/>
             </a:xfrm>
             <a:prstGeom prst="rect">
@@ -37854,7 +37854,7 @@
           </p:nvSpPr>
           <p:spPr>
             <a:xfrm>
-              <a:off x="4290785" y="4529415"/>
+              <a:off x="3977254" y="4529415"/>
               <a:ext cx="130428" cy="44175"/>
             </a:xfrm>
             <a:prstGeom prst="rect">
@@ -37889,7 +37889,7 @@
           </p:nvSpPr>
           <p:spPr>
             <a:xfrm>
-              <a:off x="4290785" y="4485240"/>
+              <a:off x="3977254" y="4485240"/>
               <a:ext cx="130428" cy="44175"/>
             </a:xfrm>
             <a:prstGeom prst="rect">
@@ -37924,7 +37924,7 @@
           </p:nvSpPr>
           <p:spPr>
             <a:xfrm>
-              <a:off x="4290785" y="4441065"/>
+              <a:off x="3977254" y="4441065"/>
               <a:ext cx="130428" cy="44175"/>
             </a:xfrm>
             <a:prstGeom prst="rect">
@@ -37959,7 +37959,7 @@
           </p:nvSpPr>
           <p:spPr>
             <a:xfrm>
-              <a:off x="4290785" y="4396890"/>
+              <a:off x="3977254" y="4396890"/>
               <a:ext cx="130428" cy="44175"/>
             </a:xfrm>
             <a:prstGeom prst="rect">
@@ -37994,7 +37994,7 @@
           </p:nvSpPr>
           <p:spPr>
             <a:xfrm>
-              <a:off x="4290785" y="4352715"/>
+              <a:off x="3977254" y="4352715"/>
               <a:ext cx="130428" cy="44175"/>
             </a:xfrm>
             <a:prstGeom prst="rect">
@@ -38029,7 +38029,7 @@
           </p:nvSpPr>
           <p:spPr>
             <a:xfrm>
-              <a:off x="4290785" y="4308540"/>
+              <a:off x="3977254" y="4308540"/>
               <a:ext cx="130428" cy="44175"/>
             </a:xfrm>
             <a:prstGeom prst="rect">
@@ -38064,7 +38064,7 @@
           </p:nvSpPr>
           <p:spPr>
             <a:xfrm>
-              <a:off x="4290785" y="4264365"/>
+              <a:off x="3977254" y="4264365"/>
               <a:ext cx="130428" cy="44175"/>
             </a:xfrm>
             <a:prstGeom prst="rect">
@@ -38099,7 +38099,7 @@
           </p:nvSpPr>
           <p:spPr>
             <a:xfrm>
-              <a:off x="4290785" y="4220190"/>
+              <a:off x="3977254" y="4220190"/>
               <a:ext cx="130428" cy="44175"/>
             </a:xfrm>
             <a:prstGeom prst="rect">
@@ -38134,7 +38134,7 @@
           </p:nvSpPr>
           <p:spPr>
             <a:xfrm>
-              <a:off x="4290785" y="4176015"/>
+              <a:off x="3977254" y="4176015"/>
               <a:ext cx="130428" cy="44175"/>
             </a:xfrm>
             <a:prstGeom prst="rect">
@@ -38169,7 +38169,7 @@
           </p:nvSpPr>
           <p:spPr>
             <a:xfrm>
-              <a:off x="4290785" y="4131840"/>
+              <a:off x="3977254" y="4131840"/>
               <a:ext cx="130428" cy="44175"/>
             </a:xfrm>
             <a:prstGeom prst="rect">
@@ -38204,7 +38204,7 @@
           </p:nvSpPr>
           <p:spPr>
             <a:xfrm>
-              <a:off x="4290785" y="4087665"/>
+              <a:off x="3977254" y="4087665"/>
               <a:ext cx="130428" cy="44175"/>
             </a:xfrm>
             <a:prstGeom prst="rect">
@@ -38239,7 +38239,7 @@
           </p:nvSpPr>
           <p:spPr>
             <a:xfrm>
-              <a:off x="4290785" y="4043490"/>
+              <a:off x="3977254" y="4043490"/>
               <a:ext cx="130428" cy="44175"/>
             </a:xfrm>
             <a:prstGeom prst="rect">
@@ -38274,7 +38274,7 @@
           </p:nvSpPr>
           <p:spPr>
             <a:xfrm>
-              <a:off x="4290785" y="3999315"/>
+              <a:off x="3977254" y="3999315"/>
               <a:ext cx="130428" cy="44175"/>
             </a:xfrm>
             <a:prstGeom prst="rect">
@@ -38309,7 +38309,7 @@
           </p:nvSpPr>
           <p:spPr>
             <a:xfrm>
-              <a:off x="4290785" y="3955140"/>
+              <a:off x="3977254" y="3955140"/>
               <a:ext cx="130428" cy="44175"/>
             </a:xfrm>
             <a:prstGeom prst="rect">
@@ -38344,7 +38344,7 @@
           </p:nvSpPr>
           <p:spPr>
             <a:xfrm>
-              <a:off x="4290785" y="3910965"/>
+              <a:off x="3977254" y="3910965"/>
               <a:ext cx="130428" cy="44175"/>
             </a:xfrm>
             <a:prstGeom prst="rect">
@@ -38379,7 +38379,7 @@
           </p:nvSpPr>
           <p:spPr>
             <a:xfrm>
-              <a:off x="4290785" y="3866790"/>
+              <a:off x="3977254" y="3866790"/>
               <a:ext cx="130428" cy="44175"/>
             </a:xfrm>
             <a:prstGeom prst="rect">
@@ -38414,7 +38414,7 @@
           </p:nvSpPr>
           <p:spPr>
             <a:xfrm>
-              <a:off x="4290785" y="3822615"/>
+              <a:off x="3977254" y="3822615"/>
               <a:ext cx="130428" cy="44175"/>
             </a:xfrm>
             <a:prstGeom prst="rect">
@@ -38449,7 +38449,7 @@
           </p:nvSpPr>
           <p:spPr>
             <a:xfrm>
-              <a:off x="4290785" y="3778440"/>
+              <a:off x="3977254" y="3778440"/>
               <a:ext cx="130428" cy="44175"/>
             </a:xfrm>
             <a:prstGeom prst="rect">
@@ -38484,7 +38484,7 @@
           </p:nvSpPr>
           <p:spPr>
             <a:xfrm>
-              <a:off x="4290785" y="3734265"/>
+              <a:off x="3977254" y="3734265"/>
               <a:ext cx="130428" cy="44175"/>
             </a:xfrm>
             <a:prstGeom prst="rect">
@@ -38519,7 +38519,7 @@
           </p:nvSpPr>
           <p:spPr>
             <a:xfrm>
-              <a:off x="4290785" y="3690090"/>
+              <a:off x="3977254" y="3690090"/>
               <a:ext cx="130428" cy="44175"/>
             </a:xfrm>
             <a:prstGeom prst="rect">
@@ -38554,7 +38554,7 @@
           </p:nvSpPr>
           <p:spPr>
             <a:xfrm>
-              <a:off x="4290785" y="3645915"/>
+              <a:off x="3977254" y="3645915"/>
               <a:ext cx="130428" cy="44175"/>
             </a:xfrm>
             <a:prstGeom prst="rect">
@@ -38589,7 +38589,7 @@
           </p:nvSpPr>
           <p:spPr>
             <a:xfrm>
-              <a:off x="4290785" y="3601740"/>
+              <a:off x="3977254" y="3601740"/>
               <a:ext cx="130428" cy="44175"/>
             </a:xfrm>
             <a:prstGeom prst="rect">
@@ -38624,7 +38624,7 @@
           </p:nvSpPr>
           <p:spPr>
             <a:xfrm>
-              <a:off x="4290785" y="3557565"/>
+              <a:off x="3977254" y="3557565"/>
               <a:ext cx="130428" cy="44175"/>
             </a:xfrm>
             <a:prstGeom prst="rect">
@@ -38659,7 +38659,7 @@
           </p:nvSpPr>
           <p:spPr>
             <a:xfrm>
-              <a:off x="4290785" y="3513390"/>
+              <a:off x="3977254" y="3513390"/>
               <a:ext cx="130428" cy="44175"/>
             </a:xfrm>
             <a:prstGeom prst="rect">
@@ -38694,7 +38694,7 @@
           </p:nvSpPr>
           <p:spPr>
             <a:xfrm>
-              <a:off x="4290785" y="3469215"/>
+              <a:off x="3977254" y="3469215"/>
               <a:ext cx="130428" cy="44175"/>
             </a:xfrm>
             <a:prstGeom prst="rect">
@@ -38729,7 +38729,7 @@
           </p:nvSpPr>
           <p:spPr>
             <a:xfrm>
-              <a:off x="4290785" y="3425040"/>
+              <a:off x="3977254" y="3425040"/>
               <a:ext cx="130428" cy="44175"/>
             </a:xfrm>
             <a:prstGeom prst="rect">
@@ -38764,7 +38764,7 @@
           </p:nvSpPr>
           <p:spPr>
             <a:xfrm>
-              <a:off x="4290785" y="3380865"/>
+              <a:off x="3977254" y="3380865"/>
               <a:ext cx="130428" cy="44175"/>
             </a:xfrm>
             <a:prstGeom prst="rect">
@@ -38799,7 +38799,7 @@
           </p:nvSpPr>
           <p:spPr>
             <a:xfrm>
-              <a:off x="4290785" y="3336690"/>
+              <a:off x="3977254" y="3336690"/>
               <a:ext cx="130428" cy="44175"/>
             </a:xfrm>
             <a:prstGeom prst="rect">
@@ -38834,7 +38834,7 @@
           </p:nvSpPr>
           <p:spPr>
             <a:xfrm>
-              <a:off x="4290785" y="3292515"/>
+              <a:off x="3977254" y="3292515"/>
               <a:ext cx="130428" cy="44175"/>
             </a:xfrm>
             <a:prstGeom prst="rect">
@@ -38869,7 +38869,7 @@
           </p:nvSpPr>
           <p:spPr>
             <a:xfrm>
-              <a:off x="4290785" y="3248340"/>
+              <a:off x="3977254" y="3248340"/>
               <a:ext cx="130428" cy="44175"/>
             </a:xfrm>
             <a:prstGeom prst="rect">
@@ -38904,7 +38904,7 @@
           </p:nvSpPr>
           <p:spPr>
             <a:xfrm>
-              <a:off x="4290785" y="3204165"/>
+              <a:off x="3977254" y="3204165"/>
               <a:ext cx="130428" cy="44175"/>
             </a:xfrm>
             <a:prstGeom prst="rect">
@@ -38939,7 +38939,7 @@
           </p:nvSpPr>
           <p:spPr>
             <a:xfrm>
-              <a:off x="4290785" y="3159990"/>
+              <a:off x="3977254" y="3159990"/>
               <a:ext cx="130428" cy="44175"/>
             </a:xfrm>
             <a:prstGeom prst="rect">
@@ -38974,7 +38974,7 @@
           </p:nvSpPr>
           <p:spPr>
             <a:xfrm>
-              <a:off x="4290785" y="3115815"/>
+              <a:off x="3977254" y="3115815"/>
               <a:ext cx="130428" cy="44175"/>
             </a:xfrm>
             <a:prstGeom prst="rect">
@@ -39009,7 +39009,7 @@
           </p:nvSpPr>
           <p:spPr>
             <a:xfrm>
-              <a:off x="4290785" y="3071640"/>
+              <a:off x="3977254" y="3071640"/>
               <a:ext cx="130428" cy="44175"/>
             </a:xfrm>
             <a:prstGeom prst="rect">
@@ -39044,7 +39044,7 @@
           </p:nvSpPr>
           <p:spPr>
             <a:xfrm>
-              <a:off x="4290785" y="3027465"/>
+              <a:off x="3977254" y="3027465"/>
               <a:ext cx="130428" cy="44175"/>
             </a:xfrm>
             <a:prstGeom prst="rect">
@@ -39079,7 +39079,7 @@
           </p:nvSpPr>
           <p:spPr>
             <a:xfrm>
-              <a:off x="4290785" y="2983290"/>
+              <a:off x="3977254" y="2983290"/>
               <a:ext cx="130428" cy="44175"/>
             </a:xfrm>
             <a:prstGeom prst="rect">
@@ -39114,7 +39114,7 @@
           </p:nvSpPr>
           <p:spPr>
             <a:xfrm>
-              <a:off x="4290785" y="2939115"/>
+              <a:off x="3977254" y="2939115"/>
               <a:ext cx="130428" cy="44175"/>
             </a:xfrm>
             <a:prstGeom prst="rect">
@@ -39149,7 +39149,7 @@
           </p:nvSpPr>
           <p:spPr>
             <a:xfrm>
-              <a:off x="4290785" y="2894940"/>
+              <a:off x="3977254" y="2894940"/>
               <a:ext cx="130428" cy="44175"/>
             </a:xfrm>
             <a:prstGeom prst="rect">
@@ -39184,7 +39184,7 @@
           </p:nvSpPr>
           <p:spPr>
             <a:xfrm>
-              <a:off x="4290785" y="2850765"/>
+              <a:off x="3977254" y="2850765"/>
               <a:ext cx="130428" cy="44175"/>
             </a:xfrm>
             <a:prstGeom prst="rect">
@@ -39219,7 +39219,7 @@
           </p:nvSpPr>
           <p:spPr>
             <a:xfrm>
-              <a:off x="4290785" y="2806590"/>
+              <a:off x="3977254" y="2806590"/>
               <a:ext cx="130428" cy="44175"/>
             </a:xfrm>
             <a:prstGeom prst="rect">
@@ -39254,7 +39254,7 @@
           </p:nvSpPr>
           <p:spPr>
             <a:xfrm>
-              <a:off x="4290785" y="2762415"/>
+              <a:off x="3977254" y="2762415"/>
               <a:ext cx="130428" cy="44175"/>
             </a:xfrm>
             <a:prstGeom prst="rect">
@@ -39289,7 +39289,7 @@
           </p:nvSpPr>
           <p:spPr>
             <a:xfrm>
-              <a:off x="4290785" y="2718240"/>
+              <a:off x="3977254" y="2718240"/>
               <a:ext cx="130428" cy="44175"/>
             </a:xfrm>
             <a:prstGeom prst="rect">
@@ -39324,7 +39324,7 @@
           </p:nvSpPr>
           <p:spPr>
             <a:xfrm>
-              <a:off x="4290785" y="2674065"/>
+              <a:off x="3977254" y="2674065"/>
               <a:ext cx="130428" cy="44175"/>
             </a:xfrm>
             <a:prstGeom prst="rect">
@@ -39359,7 +39359,7 @@
           </p:nvSpPr>
           <p:spPr>
             <a:xfrm>
-              <a:off x="4290785" y="2629890"/>
+              <a:off x="3977254" y="2629890"/>
               <a:ext cx="130428" cy="44175"/>
             </a:xfrm>
             <a:prstGeom prst="rect">
@@ -39394,7 +39394,7 @@
           </p:nvSpPr>
           <p:spPr>
             <a:xfrm>
-              <a:off x="4290785" y="2585715"/>
+              <a:off x="3977254" y="2585715"/>
               <a:ext cx="130428" cy="44175"/>
             </a:xfrm>
             <a:prstGeom prst="rect">
@@ -39429,7 +39429,7 @@
           </p:nvSpPr>
           <p:spPr>
             <a:xfrm>
-              <a:off x="4290785" y="2541540"/>
+              <a:off x="3977254" y="2541540"/>
               <a:ext cx="130428" cy="44175"/>
             </a:xfrm>
             <a:prstGeom prst="rect">
@@ -39464,7 +39464,7 @@
           </p:nvSpPr>
           <p:spPr>
             <a:xfrm>
-              <a:off x="4290785" y="2497365"/>
+              <a:off x="3977254" y="2497365"/>
               <a:ext cx="130428" cy="44175"/>
             </a:xfrm>
             <a:prstGeom prst="rect">
@@ -39499,7 +39499,7 @@
           </p:nvSpPr>
           <p:spPr>
             <a:xfrm>
-              <a:off x="4290785" y="2453190"/>
+              <a:off x="3977254" y="2453190"/>
               <a:ext cx="130428" cy="44175"/>
             </a:xfrm>
             <a:prstGeom prst="rect">
@@ -39534,7 +39534,7 @@
           </p:nvSpPr>
           <p:spPr>
             <a:xfrm>
-              <a:off x="4290785" y="2409015"/>
+              <a:off x="3977254" y="2409015"/>
               <a:ext cx="130428" cy="44175"/>
             </a:xfrm>
             <a:prstGeom prst="rect">
@@ -39569,7 +39569,7 @@
           </p:nvSpPr>
           <p:spPr>
             <a:xfrm>
-              <a:off x="4290785" y="2364840"/>
+              <a:off x="3977254" y="2364840"/>
               <a:ext cx="130428" cy="44175"/>
             </a:xfrm>
             <a:prstGeom prst="rect">
@@ -39604,7 +39604,7 @@
           </p:nvSpPr>
           <p:spPr>
             <a:xfrm>
-              <a:off x="4290785" y="2320665"/>
+              <a:off x="3977254" y="2320665"/>
               <a:ext cx="130428" cy="44175"/>
             </a:xfrm>
             <a:prstGeom prst="rect">
@@ -39639,7 +39639,7 @@
           </p:nvSpPr>
           <p:spPr>
             <a:xfrm>
-              <a:off x="4290785" y="2276490"/>
+              <a:off x="3977254" y="2276490"/>
               <a:ext cx="130428" cy="44175"/>
             </a:xfrm>
             <a:prstGeom prst="rect">
@@ -39674,7 +39674,7 @@
           </p:nvSpPr>
           <p:spPr>
             <a:xfrm>
-              <a:off x="4290785" y="2232315"/>
+              <a:off x="3977254" y="2232315"/>
               <a:ext cx="130428" cy="44175"/>
             </a:xfrm>
             <a:prstGeom prst="rect">
@@ -39709,7 +39709,7 @@
           </p:nvSpPr>
           <p:spPr>
             <a:xfrm>
-              <a:off x="4290785" y="2188140"/>
+              <a:off x="3977254" y="2188140"/>
               <a:ext cx="130428" cy="44175"/>
             </a:xfrm>
             <a:prstGeom prst="rect">
@@ -39744,7 +39744,7 @@
           </p:nvSpPr>
           <p:spPr>
             <a:xfrm>
-              <a:off x="4290785" y="2143965"/>
+              <a:off x="3977254" y="2143965"/>
               <a:ext cx="130428" cy="44175"/>
             </a:xfrm>
             <a:prstGeom prst="rect">
@@ -39779,7 +39779,7 @@
           </p:nvSpPr>
           <p:spPr>
             <a:xfrm>
-              <a:off x="4290785" y="2099790"/>
+              <a:off x="3977254" y="2099790"/>
               <a:ext cx="130428" cy="44175"/>
             </a:xfrm>
             <a:prstGeom prst="rect">
@@ -39814,7 +39814,7 @@
           </p:nvSpPr>
           <p:spPr>
             <a:xfrm>
-              <a:off x="4290785" y="2055615"/>
+              <a:off x="3977254" y="2055615"/>
               <a:ext cx="130428" cy="44175"/>
             </a:xfrm>
             <a:prstGeom prst="rect">
@@ -39849,7 +39849,7 @@
           </p:nvSpPr>
           <p:spPr>
             <a:xfrm>
-              <a:off x="4290785" y="2011440"/>
+              <a:off x="3977254" y="2011440"/>
               <a:ext cx="130428" cy="44175"/>
             </a:xfrm>
             <a:prstGeom prst="rect">
@@ -39884,7 +39884,7 @@
           </p:nvSpPr>
           <p:spPr>
             <a:xfrm>
-              <a:off x="4290785" y="1967265"/>
+              <a:off x="3977254" y="1967265"/>
               <a:ext cx="130428" cy="44175"/>
             </a:xfrm>
             <a:prstGeom prst="rect">
@@ -39919,7 +39919,7 @@
           </p:nvSpPr>
           <p:spPr>
             <a:xfrm>
-              <a:off x="4290785" y="1923090"/>
+              <a:off x="3977254" y="1923090"/>
               <a:ext cx="130428" cy="44175"/>
             </a:xfrm>
             <a:prstGeom prst="rect">
@@ -39954,7 +39954,7 @@
           </p:nvSpPr>
           <p:spPr>
             <a:xfrm>
-              <a:off x="4290785" y="1878915"/>
+              <a:off x="3977254" y="1878915"/>
               <a:ext cx="130428" cy="44175"/>
             </a:xfrm>
             <a:prstGeom prst="rect">
@@ -39989,7 +39989,7 @@
           </p:nvSpPr>
           <p:spPr>
             <a:xfrm>
-              <a:off x="4290785" y="1834740"/>
+              <a:off x="3977254" y="1834740"/>
               <a:ext cx="130428" cy="44175"/>
             </a:xfrm>
             <a:prstGeom prst="rect">
@@ -40024,7 +40024,7 @@
           </p:nvSpPr>
           <p:spPr>
             <a:xfrm>
-              <a:off x="4290785" y="1790565"/>
+              <a:off x="3977254" y="1790565"/>
               <a:ext cx="130428" cy="44175"/>
             </a:xfrm>
             <a:prstGeom prst="rect">
@@ -40059,7 +40059,7 @@
           </p:nvSpPr>
           <p:spPr>
             <a:xfrm>
-              <a:off x="4290785" y="1746390"/>
+              <a:off x="3977254" y="1746390"/>
               <a:ext cx="130428" cy="44175"/>
             </a:xfrm>
             <a:prstGeom prst="rect">
@@ -40094,7 +40094,7 @@
           </p:nvSpPr>
           <p:spPr>
             <a:xfrm>
-              <a:off x="4290785" y="1702215"/>
+              <a:off x="3977254" y="1702215"/>
               <a:ext cx="130428" cy="44175"/>
             </a:xfrm>
             <a:prstGeom prst="rect">
@@ -40129,7 +40129,7 @@
           </p:nvSpPr>
           <p:spPr>
             <a:xfrm>
-              <a:off x="4290785" y="1658040"/>
+              <a:off x="3977254" y="1658040"/>
               <a:ext cx="130428" cy="44175"/>
             </a:xfrm>
             <a:prstGeom prst="rect">
@@ -40164,7 +40164,7 @@
           </p:nvSpPr>
           <p:spPr>
             <a:xfrm>
-              <a:off x="4290785" y="1613865"/>
+              <a:off x="3977254" y="1613865"/>
               <a:ext cx="130428" cy="44175"/>
             </a:xfrm>
             <a:prstGeom prst="rect">
@@ -40199,7 +40199,7 @@
           </p:nvSpPr>
           <p:spPr>
             <a:xfrm>
-              <a:off x="4290785" y="1569690"/>
+              <a:off x="3977254" y="1569690"/>
               <a:ext cx="130428" cy="44175"/>
             </a:xfrm>
             <a:prstGeom prst="rect">
@@ -40234,7 +40234,7 @@
           </p:nvSpPr>
           <p:spPr>
             <a:xfrm>
-              <a:off x="4290785" y="1525515"/>
+              <a:off x="3977254" y="1525515"/>
               <a:ext cx="130428" cy="44175"/>
             </a:xfrm>
             <a:prstGeom prst="rect">
@@ -40269,7 +40269,7 @@
           </p:nvSpPr>
           <p:spPr>
             <a:xfrm>
-              <a:off x="4290785" y="1481340"/>
+              <a:off x="3977254" y="1481340"/>
               <a:ext cx="130428" cy="44175"/>
             </a:xfrm>
             <a:prstGeom prst="rect">
@@ -40304,7 +40304,7 @@
           </p:nvSpPr>
           <p:spPr>
             <a:xfrm>
-              <a:off x="4290785" y="1437165"/>
+              <a:off x="3977254" y="1437165"/>
               <a:ext cx="130428" cy="44175"/>
             </a:xfrm>
             <a:prstGeom prst="rect">
@@ -40339,7 +40339,7 @@
           </p:nvSpPr>
           <p:spPr>
             <a:xfrm>
-              <a:off x="4290785" y="1392990"/>
+              <a:off x="3977254" y="1392990"/>
               <a:ext cx="130428" cy="44175"/>
             </a:xfrm>
             <a:prstGeom prst="rect">
@@ -40374,7 +40374,7 @@
           </p:nvSpPr>
           <p:spPr>
             <a:xfrm>
-              <a:off x="4421213" y="6252241"/>
+              <a:off x="4107683" y="6252241"/>
               <a:ext cx="130428" cy="44175"/>
             </a:xfrm>
             <a:prstGeom prst="rect">
@@ -40409,7 +40409,7 @@
           </p:nvSpPr>
           <p:spPr>
             <a:xfrm>
-              <a:off x="4421213" y="6208066"/>
+              <a:off x="4107683" y="6208066"/>
               <a:ext cx="130428" cy="44175"/>
             </a:xfrm>
             <a:prstGeom prst="rect">
@@ -40444,7 +40444,7 @@
           </p:nvSpPr>
           <p:spPr>
             <a:xfrm>
-              <a:off x="4421213" y="6163891"/>
+              <a:off x="4107683" y="6163891"/>
               <a:ext cx="130428" cy="44175"/>
             </a:xfrm>
             <a:prstGeom prst="rect">
@@ -40479,7 +40479,7 @@
           </p:nvSpPr>
           <p:spPr>
             <a:xfrm>
-              <a:off x="4421213" y="6119716"/>
+              <a:off x="4107683" y="6119716"/>
               <a:ext cx="130428" cy="44175"/>
             </a:xfrm>
             <a:prstGeom prst="rect">
@@ -40514,7 +40514,7 @@
           </p:nvSpPr>
           <p:spPr>
             <a:xfrm>
-              <a:off x="4421213" y="6075541"/>
+              <a:off x="4107683" y="6075541"/>
               <a:ext cx="130428" cy="44175"/>
             </a:xfrm>
             <a:prstGeom prst="rect">
@@ -40549,7 +40549,7 @@
           </p:nvSpPr>
           <p:spPr>
             <a:xfrm>
-              <a:off x="4421213" y="6031366"/>
+              <a:off x="4107683" y="6031366"/>
               <a:ext cx="130428" cy="44175"/>
             </a:xfrm>
             <a:prstGeom prst="rect">
@@ -40584,7 +40584,7 @@
           </p:nvSpPr>
           <p:spPr>
             <a:xfrm>
-              <a:off x="4421213" y="5987191"/>
+              <a:off x="4107683" y="5987191"/>
               <a:ext cx="130428" cy="44175"/>
             </a:xfrm>
             <a:prstGeom prst="rect">
@@ -40619,7 +40619,7 @@
           </p:nvSpPr>
           <p:spPr>
             <a:xfrm>
-              <a:off x="4421213" y="5943016"/>
+              <a:off x="4107683" y="5943016"/>
               <a:ext cx="130428" cy="44175"/>
             </a:xfrm>
             <a:prstGeom prst="rect">
@@ -40654,7 +40654,7 @@
           </p:nvSpPr>
           <p:spPr>
             <a:xfrm>
-              <a:off x="4421213" y="5898841"/>
+              <a:off x="4107683" y="5898841"/>
               <a:ext cx="130428" cy="44175"/>
             </a:xfrm>
             <a:prstGeom prst="rect">
@@ -40689,7 +40689,7 @@
           </p:nvSpPr>
           <p:spPr>
             <a:xfrm>
-              <a:off x="4421213" y="5854666"/>
+              <a:off x="4107683" y="5854666"/>
               <a:ext cx="130428" cy="44175"/>
             </a:xfrm>
             <a:prstGeom prst="rect">
@@ -40724,7 +40724,7 @@
           </p:nvSpPr>
           <p:spPr>
             <a:xfrm>
-              <a:off x="4421213" y="5810491"/>
+              <a:off x="4107683" y="5810491"/>
               <a:ext cx="130428" cy="44175"/>
             </a:xfrm>
             <a:prstGeom prst="rect">
@@ -40759,7 +40759,7 @@
           </p:nvSpPr>
           <p:spPr>
             <a:xfrm>
-              <a:off x="4421213" y="5766316"/>
+              <a:off x="4107683" y="5766316"/>
               <a:ext cx="130428" cy="44175"/>
             </a:xfrm>
             <a:prstGeom prst="rect">
@@ -40794,7 +40794,7 @@
           </p:nvSpPr>
           <p:spPr>
             <a:xfrm>
-              <a:off x="4421213" y="5722141"/>
+              <a:off x="4107683" y="5722141"/>
               <a:ext cx="130428" cy="44175"/>
             </a:xfrm>
             <a:prstGeom prst="rect">
@@ -40829,7 +40829,7 @@
           </p:nvSpPr>
           <p:spPr>
             <a:xfrm>
-              <a:off x="4421213" y="5677966"/>
+              <a:off x="4107683" y="5677966"/>
               <a:ext cx="130428" cy="44175"/>
             </a:xfrm>
             <a:prstGeom prst="rect">
@@ -40864,7 +40864,7 @@
           </p:nvSpPr>
           <p:spPr>
             <a:xfrm>
-              <a:off x="4421213" y="5633791"/>
+              <a:off x="4107683" y="5633791"/>
               <a:ext cx="130428" cy="44175"/>
             </a:xfrm>
             <a:prstGeom prst="rect">
@@ -40899,7 +40899,7 @@
           </p:nvSpPr>
           <p:spPr>
             <a:xfrm>
-              <a:off x="4421213" y="5589616"/>
+              <a:off x="4107683" y="5589616"/>
               <a:ext cx="130428" cy="44175"/>
             </a:xfrm>
             <a:prstGeom prst="rect">
@@ -40934,7 +40934,7 @@
           </p:nvSpPr>
           <p:spPr>
             <a:xfrm>
-              <a:off x="4421213" y="5545441"/>
+              <a:off x="4107683" y="5545441"/>
               <a:ext cx="130428" cy="44175"/>
             </a:xfrm>
             <a:prstGeom prst="rect">
@@ -40969,7 +40969,7 @@
           </p:nvSpPr>
           <p:spPr>
             <a:xfrm>
-              <a:off x="4421213" y="5501266"/>
+              <a:off x="4107683" y="5501266"/>
               <a:ext cx="130428" cy="44175"/>
             </a:xfrm>
             <a:prstGeom prst="rect">
@@ -41004,7 +41004,7 @@
           </p:nvSpPr>
           <p:spPr>
             <a:xfrm>
-              <a:off x="4421213" y="5457091"/>
+              <a:off x="4107683" y="5457091"/>
               <a:ext cx="130428" cy="44175"/>
             </a:xfrm>
             <a:prstGeom prst="rect">
@@ -41039,7 +41039,7 @@
           </p:nvSpPr>
           <p:spPr>
             <a:xfrm>
-              <a:off x="4421213" y="5412916"/>
+              <a:off x="4107683" y="5412916"/>
               <a:ext cx="130428" cy="44175"/>
             </a:xfrm>
             <a:prstGeom prst="rect">
@@ -41074,7 +41074,7 @@
           </p:nvSpPr>
           <p:spPr>
             <a:xfrm>
-              <a:off x="4421213" y="5368741"/>
+              <a:off x="4107683" y="5368741"/>
               <a:ext cx="130428" cy="44175"/>
             </a:xfrm>
             <a:prstGeom prst="rect">
@@ -41109,7 +41109,7 @@
           </p:nvSpPr>
           <p:spPr>
             <a:xfrm>
-              <a:off x="4421213" y="5324566"/>
+              <a:off x="4107683" y="5324566"/>
               <a:ext cx="130428" cy="44175"/>
             </a:xfrm>
             <a:prstGeom prst="rect">
@@ -41144,7 +41144,7 @@
           </p:nvSpPr>
           <p:spPr>
             <a:xfrm>
-              <a:off x="4421213" y="5280391"/>
+              <a:off x="4107683" y="5280391"/>
               <a:ext cx="130428" cy="44175"/>
             </a:xfrm>
             <a:prstGeom prst="rect">
@@ -41179,7 +41179,7 @@
           </p:nvSpPr>
           <p:spPr>
             <a:xfrm>
-              <a:off x="4421213" y="5236216"/>
+              <a:off x="4107683" y="5236216"/>
               <a:ext cx="130428" cy="44175"/>
             </a:xfrm>
             <a:prstGeom prst="rect">
@@ -41214,7 +41214,7 @@
           </p:nvSpPr>
           <p:spPr>
             <a:xfrm>
-              <a:off x="4421213" y="5192041"/>
+              <a:off x="4107683" y="5192041"/>
               <a:ext cx="130428" cy="44175"/>
             </a:xfrm>
             <a:prstGeom prst="rect">
@@ -41249,7 +41249,7 @@
           </p:nvSpPr>
           <p:spPr>
             <a:xfrm>
-              <a:off x="4421213" y="5147866"/>
+              <a:off x="4107683" y="5147866"/>
               <a:ext cx="130428" cy="44175"/>
             </a:xfrm>
             <a:prstGeom prst="rect">
@@ -41284,7 +41284,7 @@
           </p:nvSpPr>
           <p:spPr>
             <a:xfrm>
-              <a:off x="4421213" y="5103691"/>
+              <a:off x="4107683" y="5103691"/>
               <a:ext cx="130428" cy="44175"/>
             </a:xfrm>
             <a:prstGeom prst="rect">
@@ -41319,7 +41319,7 @@
           </p:nvSpPr>
           <p:spPr>
             <a:xfrm>
-              <a:off x="4421213" y="5059516"/>
+              <a:off x="4107683" y="5059516"/>
               <a:ext cx="130428" cy="44175"/>
             </a:xfrm>
             <a:prstGeom prst="rect">
@@ -41354,7 +41354,7 @@
           </p:nvSpPr>
           <p:spPr>
             <a:xfrm>
-              <a:off x="4421213" y="5015341"/>
+              <a:off x="4107683" y="5015341"/>
               <a:ext cx="130428" cy="44175"/>
             </a:xfrm>
             <a:prstGeom prst="rect">
@@ -41389,7 +41389,7 @@
           </p:nvSpPr>
           <p:spPr>
             <a:xfrm>
-              <a:off x="4421213" y="4971166"/>
+              <a:off x="4107683" y="4971166"/>
               <a:ext cx="130428" cy="44175"/>
             </a:xfrm>
             <a:prstGeom prst="rect">
@@ -41424,7 +41424,7 @@
           </p:nvSpPr>
           <p:spPr>
             <a:xfrm>
-              <a:off x="4421213" y="4926991"/>
+              <a:off x="4107683" y="4926991"/>
               <a:ext cx="130428" cy="44175"/>
             </a:xfrm>
             <a:prstGeom prst="rect">
@@ -41459,7 +41459,7 @@
           </p:nvSpPr>
           <p:spPr>
             <a:xfrm>
-              <a:off x="4421213" y="4882816"/>
+              <a:off x="4107683" y="4882816"/>
               <a:ext cx="130428" cy="44175"/>
             </a:xfrm>
             <a:prstGeom prst="rect">
@@ -41494,7 +41494,7 @@
           </p:nvSpPr>
           <p:spPr>
             <a:xfrm>
-              <a:off x="4421213" y="4838641"/>
+              <a:off x="4107683" y="4838641"/>
               <a:ext cx="130428" cy="44175"/>
             </a:xfrm>
             <a:prstGeom prst="rect">
@@ -41529,7 +41529,7 @@
           </p:nvSpPr>
           <p:spPr>
             <a:xfrm>
-              <a:off x="4421213" y="4794466"/>
+              <a:off x="4107683" y="4794466"/>
               <a:ext cx="130428" cy="44175"/>
             </a:xfrm>
             <a:prstGeom prst="rect">
@@ -41564,7 +41564,7 @@
           </p:nvSpPr>
           <p:spPr>
             <a:xfrm>
-              <a:off x="4421213" y="4750290"/>
+              <a:off x="4107683" y="4750290"/>
               <a:ext cx="130428" cy="44175"/>
             </a:xfrm>
             <a:prstGeom prst="rect">
@@ -41599,7 +41599,7 @@
           </p:nvSpPr>
           <p:spPr>
             <a:xfrm>
-              <a:off x="4421213" y="4706115"/>
+              <a:off x="4107683" y="4706115"/>
               <a:ext cx="130428" cy="44175"/>
             </a:xfrm>
             <a:prstGeom prst="rect">
@@ -41634,7 +41634,7 @@
           </p:nvSpPr>
           <p:spPr>
             <a:xfrm>
-              <a:off x="4421213" y="4661940"/>
+              <a:off x="4107683" y="4661940"/>
               <a:ext cx="130428" cy="44175"/>
             </a:xfrm>
             <a:prstGeom prst="rect">
@@ -41669,7 +41669,7 @@
           </p:nvSpPr>
           <p:spPr>
             <a:xfrm>
-              <a:off x="4421213" y="4617765"/>
+              <a:off x="4107683" y="4617765"/>
               <a:ext cx="130428" cy="44175"/>
             </a:xfrm>
             <a:prstGeom prst="rect">
@@ -41704,7 +41704,7 @@
           </p:nvSpPr>
           <p:spPr>
             <a:xfrm>
-              <a:off x="4421213" y="4573590"/>
+              <a:off x="4107683" y="4573590"/>
               <a:ext cx="130428" cy="44175"/>
             </a:xfrm>
             <a:prstGeom prst="rect">
@@ -41739,7 +41739,7 @@
           </p:nvSpPr>
           <p:spPr>
             <a:xfrm>
-              <a:off x="4421213" y="4529415"/>
+              <a:off x="4107683" y="4529415"/>
               <a:ext cx="130428" cy="44175"/>
             </a:xfrm>
             <a:prstGeom prst="rect">
@@ -41774,7 +41774,7 @@
           </p:nvSpPr>
           <p:spPr>
             <a:xfrm>
-              <a:off x="4421213" y="4485240"/>
+              <a:off x="4107683" y="4485240"/>
               <a:ext cx="130428" cy="44175"/>
             </a:xfrm>
             <a:prstGeom prst="rect">
@@ -41809,7 +41809,7 @@
           </p:nvSpPr>
           <p:spPr>
             <a:xfrm>
-              <a:off x="4421213" y="4441065"/>
+              <a:off x="4107683" y="4441065"/>
               <a:ext cx="130428" cy="44175"/>
             </a:xfrm>
             <a:prstGeom prst="rect">
@@ -41844,7 +41844,7 @@
           </p:nvSpPr>
           <p:spPr>
             <a:xfrm>
-              <a:off x="4421213" y="4396890"/>
+              <a:off x="4107683" y="4396890"/>
               <a:ext cx="130428" cy="44175"/>
             </a:xfrm>
             <a:prstGeom prst="rect">
@@ -41879,7 +41879,7 @@
           </p:nvSpPr>
           <p:spPr>
             <a:xfrm>
-              <a:off x="4421213" y="4352715"/>
+              <a:off x="4107683" y="4352715"/>
               <a:ext cx="130428" cy="44175"/>
             </a:xfrm>
             <a:prstGeom prst="rect">
@@ -41914,7 +41914,7 @@
           </p:nvSpPr>
           <p:spPr>
             <a:xfrm>
-              <a:off x="4421213" y="4308540"/>
+              <a:off x="4107683" y="4308540"/>
               <a:ext cx="130428" cy="44175"/>
             </a:xfrm>
             <a:prstGeom prst="rect">
@@ -41949,7 +41949,7 @@
           </p:nvSpPr>
           <p:spPr>
             <a:xfrm>
-              <a:off x="4421213" y="4264365"/>
+              <a:off x="4107683" y="4264365"/>
               <a:ext cx="130428" cy="44175"/>
             </a:xfrm>
             <a:prstGeom prst="rect">
@@ -41984,7 +41984,7 @@
           </p:nvSpPr>
           <p:spPr>
             <a:xfrm>
-              <a:off x="4421213" y="4220190"/>
+              <a:off x="4107683" y="4220190"/>
               <a:ext cx="130428" cy="44175"/>
             </a:xfrm>
             <a:prstGeom prst="rect">
@@ -42019,7 +42019,7 @@
           </p:nvSpPr>
           <p:spPr>
             <a:xfrm>
-              <a:off x="4421213" y="4176015"/>
+              <a:off x="4107683" y="4176015"/>
               <a:ext cx="130428" cy="44175"/>
             </a:xfrm>
             <a:prstGeom prst="rect">
@@ -42054,7 +42054,7 @@
           </p:nvSpPr>
           <p:spPr>
             <a:xfrm>
-              <a:off x="4421213" y="4131840"/>
+              <a:off x="4107683" y="4131840"/>
               <a:ext cx="130428" cy="44175"/>
             </a:xfrm>
             <a:prstGeom prst="rect">
@@ -42089,7 +42089,7 @@
           </p:nvSpPr>
           <p:spPr>
             <a:xfrm>
-              <a:off x="4421213" y="4087665"/>
+              <a:off x="4107683" y="4087665"/>
               <a:ext cx="130428" cy="44175"/>
             </a:xfrm>
             <a:prstGeom prst="rect">
@@ -42124,7 +42124,7 @@
           </p:nvSpPr>
           <p:spPr>
             <a:xfrm>
-              <a:off x="4421213" y="4043490"/>
+              <a:off x="4107683" y="4043490"/>
               <a:ext cx="130428" cy="44175"/>
             </a:xfrm>
             <a:prstGeom prst="rect">
@@ -42159,7 +42159,7 @@
           </p:nvSpPr>
           <p:spPr>
             <a:xfrm>
-              <a:off x="4421213" y="3999315"/>
+              <a:off x="4107683" y="3999315"/>
               <a:ext cx="130428" cy="44175"/>
             </a:xfrm>
             <a:prstGeom prst="rect">
@@ -42194,7 +42194,7 @@
           </p:nvSpPr>
           <p:spPr>
             <a:xfrm>
-              <a:off x="4421213" y="3955140"/>
+              <a:off x="4107683" y="3955140"/>
               <a:ext cx="130428" cy="44175"/>
             </a:xfrm>
             <a:prstGeom prst="rect">
@@ -42229,7 +42229,7 @@
           </p:nvSpPr>
           <p:spPr>
             <a:xfrm>
-              <a:off x="4421213" y="3910965"/>
+              <a:off x="4107683" y="3910965"/>
               <a:ext cx="130428" cy="44175"/>
             </a:xfrm>
             <a:prstGeom prst="rect">
@@ -42264,7 +42264,7 @@
           </p:nvSpPr>
           <p:spPr>
             <a:xfrm>
-              <a:off x="4421213" y="3866790"/>
+              <a:off x="4107683" y="3866790"/>
               <a:ext cx="130428" cy="44175"/>
             </a:xfrm>
             <a:prstGeom prst="rect">
@@ -42299,7 +42299,7 @@
           </p:nvSpPr>
           <p:spPr>
             <a:xfrm>
-              <a:off x="4421213" y="3822615"/>
+              <a:off x="4107683" y="3822615"/>
               <a:ext cx="130428" cy="44175"/>
             </a:xfrm>
             <a:prstGeom prst="rect">
@@ -42334,7 +42334,7 @@
           </p:nvSpPr>
           <p:spPr>
             <a:xfrm>
-              <a:off x="4421213" y="3778440"/>
+              <a:off x="4107683" y="3778440"/>
               <a:ext cx="130428" cy="44175"/>
             </a:xfrm>
             <a:prstGeom prst="rect">
@@ -42369,7 +42369,7 @@
           </p:nvSpPr>
           <p:spPr>
             <a:xfrm>
-              <a:off x="4421213" y="3734265"/>
+              <a:off x="4107683" y="3734265"/>
               <a:ext cx="130428" cy="44175"/>
             </a:xfrm>
             <a:prstGeom prst="rect">
@@ -42404,7 +42404,7 @@
           </p:nvSpPr>
           <p:spPr>
             <a:xfrm>
-              <a:off x="4421213" y="3690090"/>
+              <a:off x="4107683" y="3690090"/>
               <a:ext cx="130428" cy="44175"/>
             </a:xfrm>
             <a:prstGeom prst="rect">
@@ -42439,7 +42439,7 @@
           </p:nvSpPr>
           <p:spPr>
             <a:xfrm>
-              <a:off x="4421213" y="3645915"/>
+              <a:off x="4107683" y="3645915"/>
               <a:ext cx="130428" cy="44175"/>
             </a:xfrm>
             <a:prstGeom prst="rect">
@@ -42474,7 +42474,7 @@
           </p:nvSpPr>
           <p:spPr>
             <a:xfrm>
-              <a:off x="4421213" y="3601740"/>
+              <a:off x="4107683" y="3601740"/>
               <a:ext cx="130428" cy="44175"/>
             </a:xfrm>
             <a:prstGeom prst="rect">
@@ -42509,7 +42509,7 @@
           </p:nvSpPr>
           <p:spPr>
             <a:xfrm>
-              <a:off x="4421213" y="3557565"/>
+              <a:off x="4107683" y="3557565"/>
               <a:ext cx="130428" cy="44175"/>
             </a:xfrm>
             <a:prstGeom prst="rect">
@@ -42544,7 +42544,7 @@
           </p:nvSpPr>
           <p:spPr>
             <a:xfrm>
-              <a:off x="4421213" y="3513390"/>
+              <a:off x="4107683" y="3513390"/>
               <a:ext cx="130428" cy="44175"/>
             </a:xfrm>
             <a:prstGeom prst="rect">
@@ -42579,7 +42579,7 @@
           </p:nvSpPr>
           <p:spPr>
             <a:xfrm>
-              <a:off x="4421213" y="3469215"/>
+              <a:off x="4107683" y="3469215"/>
               <a:ext cx="130428" cy="44175"/>
             </a:xfrm>
             <a:prstGeom prst="rect">
@@ -42614,7 +42614,7 @@
           </p:nvSpPr>
           <p:spPr>
             <a:xfrm>
-              <a:off x="4421213" y="3425040"/>
+              <a:off x="4107683" y="3425040"/>
               <a:ext cx="130428" cy="44175"/>
             </a:xfrm>
             <a:prstGeom prst="rect">
@@ -42649,7 +42649,7 @@
           </p:nvSpPr>
           <p:spPr>
             <a:xfrm>
-              <a:off x="4421213" y="3380865"/>
+              <a:off x="4107683" y="3380865"/>
               <a:ext cx="130428" cy="44175"/>
             </a:xfrm>
             <a:prstGeom prst="rect">
@@ -42684,7 +42684,7 @@
           </p:nvSpPr>
           <p:spPr>
             <a:xfrm>
-              <a:off x="4421213" y="3336690"/>
+              <a:off x="4107683" y="3336690"/>
               <a:ext cx="130428" cy="44175"/>
             </a:xfrm>
             <a:prstGeom prst="rect">
@@ -42719,7 +42719,7 @@
           </p:nvSpPr>
           <p:spPr>
             <a:xfrm>
-              <a:off x="4421213" y="3292515"/>
+              <a:off x="4107683" y="3292515"/>
               <a:ext cx="130428" cy="44175"/>
             </a:xfrm>
             <a:prstGeom prst="rect">
@@ -42754,7 +42754,7 @@
           </p:nvSpPr>
           <p:spPr>
             <a:xfrm>
-              <a:off x="4421213" y="3248340"/>
+              <a:off x="4107683" y="3248340"/>
               <a:ext cx="130428" cy="44175"/>
             </a:xfrm>
             <a:prstGeom prst="rect">
@@ -42789,7 +42789,7 @@
           </p:nvSpPr>
           <p:spPr>
             <a:xfrm>
-              <a:off x="4421213" y="3204165"/>
+              <a:off x="4107683" y="3204165"/>
               <a:ext cx="130428" cy="44175"/>
             </a:xfrm>
             <a:prstGeom prst="rect">
@@ -42824,7 +42824,7 @@
           </p:nvSpPr>
           <p:spPr>
             <a:xfrm>
-              <a:off x="4421213" y="3159990"/>
+              <a:off x="4107683" y="3159990"/>
               <a:ext cx="130428" cy="44175"/>
             </a:xfrm>
             <a:prstGeom prst="rect">
@@ -42859,7 +42859,7 @@
           </p:nvSpPr>
           <p:spPr>
             <a:xfrm>
-              <a:off x="4421213" y="3115815"/>
+              <a:off x="4107683" y="3115815"/>
               <a:ext cx="130428" cy="44175"/>
             </a:xfrm>
             <a:prstGeom prst="rect">
@@ -42894,7 +42894,7 @@
           </p:nvSpPr>
           <p:spPr>
             <a:xfrm>
-              <a:off x="4421213" y="3071640"/>
+              <a:off x="4107683" y="3071640"/>
               <a:ext cx="130428" cy="44175"/>
             </a:xfrm>
             <a:prstGeom prst="rect">
@@ -42929,7 +42929,7 @@
           </p:nvSpPr>
           <p:spPr>
             <a:xfrm>
-              <a:off x="4421213" y="3027465"/>
+              <a:off x="4107683" y="3027465"/>
               <a:ext cx="130428" cy="44175"/>
             </a:xfrm>
             <a:prstGeom prst="rect">
@@ -42964,7 +42964,7 @@
           </p:nvSpPr>
           <p:spPr>
             <a:xfrm>
-              <a:off x="4421213" y="2983290"/>
+              <a:off x="4107683" y="2983290"/>
               <a:ext cx="130428" cy="44175"/>
             </a:xfrm>
             <a:prstGeom prst="rect">
@@ -42999,7 +42999,7 @@
           </p:nvSpPr>
           <p:spPr>
             <a:xfrm>
-              <a:off x="4421213" y="2939115"/>
+              <a:off x="4107683" y="2939115"/>
               <a:ext cx="130428" cy="44175"/>
             </a:xfrm>
             <a:prstGeom prst="rect">
@@ -43034,7 +43034,7 @@
           </p:nvSpPr>
           <p:spPr>
             <a:xfrm>
-              <a:off x="4421213" y="2894940"/>
+              <a:off x="4107683" y="2894940"/>
               <a:ext cx="130428" cy="44175"/>
             </a:xfrm>
             <a:prstGeom prst="rect">
@@ -43069,7 +43069,7 @@
           </p:nvSpPr>
           <p:spPr>
             <a:xfrm>
-              <a:off x="4421213" y="2850765"/>
+              <a:off x="4107683" y="2850765"/>
               <a:ext cx="130428" cy="44175"/>
             </a:xfrm>
             <a:prstGeom prst="rect">
@@ -43104,7 +43104,7 @@
           </p:nvSpPr>
           <p:spPr>
             <a:xfrm>
-              <a:off x="4421213" y="2806590"/>
+              <a:off x="4107683" y="2806590"/>
               <a:ext cx="130428" cy="44175"/>
             </a:xfrm>
             <a:prstGeom prst="rect">
@@ -43139,7 +43139,7 @@
           </p:nvSpPr>
           <p:spPr>
             <a:xfrm>
-              <a:off x="4421213" y="2762415"/>
+              <a:off x="4107683" y="2762415"/>
               <a:ext cx="130428" cy="44175"/>
             </a:xfrm>
             <a:prstGeom prst="rect">
@@ -43174,7 +43174,7 @@
           </p:nvSpPr>
           <p:spPr>
             <a:xfrm>
-              <a:off x="4421213" y="2718240"/>
+              <a:off x="4107683" y="2718240"/>
               <a:ext cx="130428" cy="44175"/>
             </a:xfrm>
             <a:prstGeom prst="rect">
@@ -43209,7 +43209,7 @@
           </p:nvSpPr>
           <p:spPr>
             <a:xfrm>
-              <a:off x="4421213" y="2674065"/>
+              <a:off x="4107683" y="2674065"/>
               <a:ext cx="130428" cy="44175"/>
             </a:xfrm>
             <a:prstGeom prst="rect">
@@ -43244,7 +43244,7 @@
           </p:nvSpPr>
           <p:spPr>
             <a:xfrm>
-              <a:off x="4421213" y="2629890"/>
+              <a:off x="4107683" y="2629890"/>
               <a:ext cx="130428" cy="44175"/>
             </a:xfrm>
             <a:prstGeom prst="rect">
@@ -43279,7 +43279,7 @@
           </p:nvSpPr>
           <p:spPr>
             <a:xfrm>
-              <a:off x="4421213" y="2585715"/>
+              <a:off x="4107683" y="2585715"/>
               <a:ext cx="130428" cy="44175"/>
             </a:xfrm>
             <a:prstGeom prst="rect">
@@ -43314,7 +43314,7 @@
           </p:nvSpPr>
           <p:spPr>
             <a:xfrm>
-              <a:off x="4421213" y="2541540"/>
+              <a:off x="4107683" y="2541540"/>
               <a:ext cx="130428" cy="44175"/>
             </a:xfrm>
             <a:prstGeom prst="rect">
@@ -43349,7 +43349,7 @@
           </p:nvSpPr>
           <p:spPr>
             <a:xfrm>
-              <a:off x="4421213" y="2497365"/>
+              <a:off x="4107683" y="2497365"/>
               <a:ext cx="130428" cy="44175"/>
             </a:xfrm>
             <a:prstGeom prst="rect">
@@ -43384,7 +43384,7 @@
           </p:nvSpPr>
           <p:spPr>
             <a:xfrm>
-              <a:off x="4421213" y="2453190"/>
+              <a:off x="4107683" y="2453190"/>
               <a:ext cx="130428" cy="44175"/>
             </a:xfrm>
             <a:prstGeom prst="rect">
@@ -43419,7 +43419,7 @@
           </p:nvSpPr>
           <p:spPr>
             <a:xfrm>
-              <a:off x="4421213" y="2409015"/>
+              <a:off x="4107683" y="2409015"/>
               <a:ext cx="130428" cy="44175"/>
             </a:xfrm>
             <a:prstGeom prst="rect">
@@ -43454,7 +43454,7 @@
           </p:nvSpPr>
           <p:spPr>
             <a:xfrm>
-              <a:off x="4421213" y="2364840"/>
+              <a:off x="4107683" y="2364840"/>
               <a:ext cx="130428" cy="44175"/>
             </a:xfrm>
             <a:prstGeom prst="rect">
@@ -43489,7 +43489,7 @@
           </p:nvSpPr>
           <p:spPr>
             <a:xfrm>
-              <a:off x="4421213" y="2320665"/>
+              <a:off x="4107683" y="2320665"/>
               <a:ext cx="130428" cy="44175"/>
             </a:xfrm>
             <a:prstGeom prst="rect">
@@ -43524,7 +43524,7 @@
           </p:nvSpPr>
           <p:spPr>
             <a:xfrm>
-              <a:off x="4421213" y="2276490"/>
+              <a:off x="4107683" y="2276490"/>
               <a:ext cx="130428" cy="44175"/>
             </a:xfrm>
             <a:prstGeom prst="rect">
@@ -43559,7 +43559,7 @@
           </p:nvSpPr>
           <p:spPr>
             <a:xfrm>
-              <a:off x="4421213" y="2232315"/>
+              <a:off x="4107683" y="2232315"/>
               <a:ext cx="130428" cy="44175"/>
             </a:xfrm>
             <a:prstGeom prst="rect">
@@ -43594,7 +43594,7 @@
           </p:nvSpPr>
           <p:spPr>
             <a:xfrm>
-              <a:off x="4421213" y="2188140"/>
+              <a:off x="4107683" y="2188140"/>
               <a:ext cx="130428" cy="44175"/>
             </a:xfrm>
             <a:prstGeom prst="rect">
@@ -43629,7 +43629,7 @@
           </p:nvSpPr>
           <p:spPr>
             <a:xfrm>
-              <a:off x="4421213" y="2143965"/>
+              <a:off x="4107683" y="2143965"/>
               <a:ext cx="130428" cy="44175"/>
             </a:xfrm>
             <a:prstGeom prst="rect">
@@ -43664,7 +43664,7 @@
           </p:nvSpPr>
           <p:spPr>
             <a:xfrm>
-              <a:off x="4421213" y="2099790"/>
+              <a:off x="4107683" y="2099790"/>
               <a:ext cx="130428" cy="44175"/>
             </a:xfrm>
             <a:prstGeom prst="rect">
@@ -43699,7 +43699,7 @@
           </p:nvSpPr>
           <p:spPr>
             <a:xfrm>
-              <a:off x="4421213" y="2055615"/>
+              <a:off x="4107683" y="2055615"/>
               <a:ext cx="130428" cy="44175"/>
             </a:xfrm>
             <a:prstGeom prst="rect">
@@ -43734,7 +43734,7 @@
           </p:nvSpPr>
           <p:spPr>
             <a:xfrm>
-              <a:off x="4421213" y="2011440"/>
+              <a:off x="4107683" y="2011440"/>
               <a:ext cx="130428" cy="44175"/>
             </a:xfrm>
             <a:prstGeom prst="rect">
@@ -43769,7 +43769,7 @@
           </p:nvSpPr>
           <p:spPr>
             <a:xfrm>
-              <a:off x="4421213" y="1967265"/>
+              <a:off x="4107683" y="1967265"/>
               <a:ext cx="130428" cy="44175"/>
             </a:xfrm>
             <a:prstGeom prst="rect">
@@ -43804,7 +43804,7 @@
           </p:nvSpPr>
           <p:spPr>
             <a:xfrm>
-              <a:off x="4421213" y="1923090"/>
+              <a:off x="4107683" y="1923090"/>
               <a:ext cx="130428" cy="44175"/>
             </a:xfrm>
             <a:prstGeom prst="rect">
@@ -43839,7 +43839,7 @@
           </p:nvSpPr>
           <p:spPr>
             <a:xfrm>
-              <a:off x="4421213" y="1878915"/>
+              <a:off x="4107683" y="1878915"/>
               <a:ext cx="130428" cy="44175"/>
             </a:xfrm>
             <a:prstGeom prst="rect">
@@ -43874,7 +43874,7 @@
           </p:nvSpPr>
           <p:spPr>
             <a:xfrm>
-              <a:off x="4421213" y="1834740"/>
+              <a:off x="4107683" y="1834740"/>
               <a:ext cx="130428" cy="44175"/>
             </a:xfrm>
             <a:prstGeom prst="rect">
@@ -43909,7 +43909,7 @@
           </p:nvSpPr>
           <p:spPr>
             <a:xfrm>
-              <a:off x="4421213" y="1790565"/>
+              <a:off x="4107683" y="1790565"/>
               <a:ext cx="130428" cy="44175"/>
             </a:xfrm>
             <a:prstGeom prst="rect">
@@ -43944,7 +43944,7 @@
           </p:nvSpPr>
           <p:spPr>
             <a:xfrm>
-              <a:off x="4421213" y="1746390"/>
+              <a:off x="4107683" y="1746390"/>
               <a:ext cx="130428" cy="44175"/>
             </a:xfrm>
             <a:prstGeom prst="rect">
@@ -43979,7 +43979,7 @@
           </p:nvSpPr>
           <p:spPr>
             <a:xfrm>
-              <a:off x="4421213" y="1702215"/>
+              <a:off x="4107683" y="1702215"/>
               <a:ext cx="130428" cy="44175"/>
             </a:xfrm>
             <a:prstGeom prst="rect">
@@ -44014,7 +44014,7 @@
           </p:nvSpPr>
           <p:spPr>
             <a:xfrm>
-              <a:off x="4421213" y="1658040"/>
+              <a:off x="4107683" y="1658040"/>
               <a:ext cx="130428" cy="44175"/>
             </a:xfrm>
             <a:prstGeom prst="rect">
@@ -44049,7 +44049,7 @@
           </p:nvSpPr>
           <p:spPr>
             <a:xfrm>
-              <a:off x="4421213" y="1613865"/>
+              <a:off x="4107683" y="1613865"/>
               <a:ext cx="130428" cy="44175"/>
             </a:xfrm>
             <a:prstGeom prst="rect">
@@ -44084,7 +44084,7 @@
           </p:nvSpPr>
           <p:spPr>
             <a:xfrm>
-              <a:off x="4421213" y="1569690"/>
+              <a:off x="4107683" y="1569690"/>
               <a:ext cx="130428" cy="44175"/>
             </a:xfrm>
             <a:prstGeom prst="rect">
@@ -44119,7 +44119,7 @@
           </p:nvSpPr>
           <p:spPr>
             <a:xfrm>
-              <a:off x="4421213" y="1525515"/>
+              <a:off x="4107683" y="1525515"/>
               <a:ext cx="130428" cy="44175"/>
             </a:xfrm>
             <a:prstGeom prst="rect">
@@ -44154,7 +44154,7 @@
           </p:nvSpPr>
           <p:spPr>
             <a:xfrm>
-              <a:off x="4421213" y="1481340"/>
+              <a:off x="4107683" y="1481340"/>
               <a:ext cx="130428" cy="44175"/>
             </a:xfrm>
             <a:prstGeom prst="rect">
@@ -44189,7 +44189,7 @@
           </p:nvSpPr>
           <p:spPr>
             <a:xfrm>
-              <a:off x="4421213" y="1437165"/>
+              <a:off x="4107683" y="1437165"/>
               <a:ext cx="130428" cy="44175"/>
             </a:xfrm>
             <a:prstGeom prst="rect">
@@ -44224,7 +44224,7 @@
           </p:nvSpPr>
           <p:spPr>
             <a:xfrm>
-              <a:off x="4421213" y="1392990"/>
+              <a:off x="4107683" y="1392990"/>
               <a:ext cx="130428" cy="44175"/>
             </a:xfrm>
             <a:prstGeom prst="rect">

</xml_diff>